<commit_message>
Task 1 Complete and Starting Task 2
</commit_message>
<xml_diff>
--- a/SirjanaBhatta-SouthbridgePublicSchools.pptx
+++ b/SirjanaBhatta-SouthbridgePublicSchools.pptx
@@ -4,10 +4,19 @@
   <p:sldMasterIdLst>
     <p:sldMasterId id="2147483648" r:id="rId1"/>
   </p:sldMasterIdLst>
+  <p:notesMasterIdLst>
+    <p:notesMasterId r:id="rId11"/>
+  </p:notesMasterIdLst>
   <p:sldIdLst>
     <p:sldId id="256" r:id="rId2"/>
-    <p:sldId id="257" r:id="rId3"/>
-    <p:sldId id="258" r:id="rId4"/>
+    <p:sldId id="262" r:id="rId3"/>
+    <p:sldId id="257" r:id="rId4"/>
+    <p:sldId id="258" r:id="rId5"/>
+    <p:sldId id="260" r:id="rId6"/>
+    <p:sldId id="261" r:id="rId7"/>
+    <p:sldId id="265" r:id="rId8"/>
+    <p:sldId id="263" r:id="rId9"/>
+    <p:sldId id="264" r:id="rId10"/>
   </p:sldIdLst>
   <p:sldSz cx="12192000" cy="6858000"/>
   <p:notesSz cx="6858000" cy="9144000"/>
@@ -106,7 +115,2213 @@
       </a:defRPr>
     </a:lvl9pPr>
   </p:defaultTextStyle>
+  <p:extLst>
+    <p:ext uri="{EFAFB233-063F-42B5-8137-9DF3F51BA10A}">
+      <p15:sldGuideLst xmlns:p15="http://schemas.microsoft.com/office/powerpoint/2012/main"/>
+    </p:ext>
+  </p:extLst>
 </p:presentation>
+</file>
+
+<file path=ppt/charts/chartEx1.xml><?xml version="1.0" encoding="utf-8"?>
+<cx:chartSpace xmlns:a="http://schemas.openxmlformats.org/drawingml/2006/main" xmlns:r="http://schemas.openxmlformats.org/officeDocument/2006/relationships" xmlns:cx="http://schemas.microsoft.com/office/drawing/2014/chartex">
+  <cx:chartData>
+    <cx:externalData r:id="rId1" cx:autoUpdate="0"/>
+    <cx:data id="0">
+      <cx:numDim type="val">
+        <cx:f>'Composite Score of 2022'!$A$2:$A$150</cx:f>
+        <cx:lvl ptCount="149" formatCode="General">
+          <cx:pt idx="0">268</cx:pt>
+          <cx:pt idx="1">268</cx:pt>
+          <cx:pt idx="2">273</cx:pt>
+          <cx:pt idx="3">277</cx:pt>
+          <cx:pt idx="4">278</cx:pt>
+          <cx:pt idx="5">279</cx:pt>
+          <cx:pt idx="6">280</cx:pt>
+          <cx:pt idx="7">281</cx:pt>
+          <cx:pt idx="8">281</cx:pt>
+          <cx:pt idx="9">281</cx:pt>
+          <cx:pt idx="10">281</cx:pt>
+          <cx:pt idx="11">282</cx:pt>
+          <cx:pt idx="12">283</cx:pt>
+          <cx:pt idx="13">283</cx:pt>
+          <cx:pt idx="14">283</cx:pt>
+          <cx:pt idx="15">283</cx:pt>
+          <cx:pt idx="16">283</cx:pt>
+          <cx:pt idx="17">284</cx:pt>
+          <cx:pt idx="18">284</cx:pt>
+          <cx:pt idx="19">285</cx:pt>
+          <cx:pt idx="20">286</cx:pt>
+          <cx:pt idx="21">287</cx:pt>
+          <cx:pt idx="22">287</cx:pt>
+          <cx:pt idx="23">287</cx:pt>
+          <cx:pt idx="24">289</cx:pt>
+          <cx:pt idx="25">289</cx:pt>
+          <cx:pt idx="26">290</cx:pt>
+          <cx:pt idx="27">291</cx:pt>
+          <cx:pt idx="28">292</cx:pt>
+          <cx:pt idx="29">292</cx:pt>
+          <cx:pt idx="30">293</cx:pt>
+          <cx:pt idx="31">294</cx:pt>
+          <cx:pt idx="32">295</cx:pt>
+          <cx:pt idx="33">295</cx:pt>
+          <cx:pt idx="34">297</cx:pt>
+          <cx:pt idx="35">297</cx:pt>
+          <cx:pt idx="36">297</cx:pt>
+          <cx:pt idx="37">298</cx:pt>
+          <cx:pt idx="38">298</cx:pt>
+          <cx:pt idx="39">300</cx:pt>
+          <cx:pt idx="40">300</cx:pt>
+          <cx:pt idx="41">302</cx:pt>
+          <cx:pt idx="42">302</cx:pt>
+          <cx:pt idx="43">302</cx:pt>
+          <cx:pt idx="44">302</cx:pt>
+          <cx:pt idx="45">302</cx:pt>
+          <cx:pt idx="46">303</cx:pt>
+          <cx:pt idx="47">303</cx:pt>
+          <cx:pt idx="48">303</cx:pt>
+          <cx:pt idx="49">304</cx:pt>
+          <cx:pt idx="50">304</cx:pt>
+          <cx:pt idx="51">305</cx:pt>
+          <cx:pt idx="52">305</cx:pt>
+          <cx:pt idx="53">306</cx:pt>
+          <cx:pt idx="54">307</cx:pt>
+          <cx:pt idx="55">308</cx:pt>
+          <cx:pt idx="56">310</cx:pt>
+          <cx:pt idx="57">311</cx:pt>
+          <cx:pt idx="58">311</cx:pt>
+          <cx:pt idx="59">313</cx:pt>
+          <cx:pt idx="60">314</cx:pt>
+          <cx:pt idx="61">315</cx:pt>
+          <cx:pt idx="62">316</cx:pt>
+          <cx:pt idx="63">316</cx:pt>
+          <cx:pt idx="64">316</cx:pt>
+          <cx:pt idx="65">317</cx:pt>
+          <cx:pt idx="66">318</cx:pt>
+          <cx:pt idx="67">318</cx:pt>
+          <cx:pt idx="68">318</cx:pt>
+          <cx:pt idx="69">319</cx:pt>
+          <cx:pt idx="70">321</cx:pt>
+          <cx:pt idx="71">323</cx:pt>
+          <cx:pt idx="72">323</cx:pt>
+          <cx:pt idx="73">325</cx:pt>
+          <cx:pt idx="74">325</cx:pt>
+          <cx:pt idx="75">327</cx:pt>
+          <cx:pt idx="76">327</cx:pt>
+          <cx:pt idx="77">327</cx:pt>
+          <cx:pt idx="78">328</cx:pt>
+          <cx:pt idx="79">328</cx:pt>
+          <cx:pt idx="80">330</cx:pt>
+          <cx:pt idx="81">331</cx:pt>
+          <cx:pt idx="82">332</cx:pt>
+          <cx:pt idx="83">332</cx:pt>
+          <cx:pt idx="84">332</cx:pt>
+          <cx:pt idx="85">333</cx:pt>
+          <cx:pt idx="86">334</cx:pt>
+          <cx:pt idx="87">336</cx:pt>
+          <cx:pt idx="88">337</cx:pt>
+          <cx:pt idx="89">337</cx:pt>
+          <cx:pt idx="90">338</cx:pt>
+          <cx:pt idx="91">339</cx:pt>
+          <cx:pt idx="92">340</cx:pt>
+          <cx:pt idx="93">342</cx:pt>
+          <cx:pt idx="94">344</cx:pt>
+          <cx:pt idx="95">346</cx:pt>
+          <cx:pt idx="96">347</cx:pt>
+          <cx:pt idx="97">348</cx:pt>
+          <cx:pt idx="98">349</cx:pt>
+          <cx:pt idx="99">349</cx:pt>
+          <cx:pt idx="100">349</cx:pt>
+          <cx:pt idx="101">349</cx:pt>
+          <cx:pt idx="102">350</cx:pt>
+          <cx:pt idx="103">350</cx:pt>
+          <cx:pt idx="104">350</cx:pt>
+          <cx:pt idx="105">351</cx:pt>
+          <cx:pt idx="106">351</cx:pt>
+          <cx:pt idx="107">351</cx:pt>
+          <cx:pt idx="108">351</cx:pt>
+          <cx:pt idx="109">352</cx:pt>
+          <cx:pt idx="110">352</cx:pt>
+          <cx:pt idx="111">353</cx:pt>
+          <cx:pt idx="112">353</cx:pt>
+          <cx:pt idx="113">356</cx:pt>
+          <cx:pt idx="114">356</cx:pt>
+          <cx:pt idx="115">357</cx:pt>
+          <cx:pt idx="116">358</cx:pt>
+          <cx:pt idx="117">358</cx:pt>
+          <cx:pt idx="118">359</cx:pt>
+          <cx:pt idx="119">361</cx:pt>
+          <cx:pt idx="120">364</cx:pt>
+          <cx:pt idx="121">367</cx:pt>
+          <cx:pt idx="122">367</cx:pt>
+          <cx:pt idx="123">368</cx:pt>
+          <cx:pt idx="124">369</cx:pt>
+          <cx:pt idx="125">372</cx:pt>
+          <cx:pt idx="126">372</cx:pt>
+          <cx:pt idx="127">375</cx:pt>
+          <cx:pt idx="128">376</cx:pt>
+          <cx:pt idx="129">376</cx:pt>
+          <cx:pt idx="130">376</cx:pt>
+          <cx:pt idx="131">379</cx:pt>
+          <cx:pt idx="132">384</cx:pt>
+          <cx:pt idx="133">385</cx:pt>
+          <cx:pt idx="134">386</cx:pt>
+          <cx:pt idx="135">387</cx:pt>
+          <cx:pt idx="136">400</cx:pt>
+          <cx:pt idx="137">412</cx:pt>
+          <cx:pt idx="138">427</cx:pt>
+          <cx:pt idx="139">448</cx:pt>
+        </cx:lvl>
+      </cx:numDim>
+    </cx:data>
+  </cx:chartData>
+  <cx:chart>
+    <cx:title pos="t" align="ctr" overlay="0">
+      <cx:tx>
+        <cx:txData>
+          <cx:v>Beginning Composite Score for 2022</cx:v>
+        </cx:txData>
+      </cx:tx>
+      <cx:txPr>
+        <a:bodyPr spcFirstLastPara="1" vertOverflow="ellipsis" horzOverflow="overflow" wrap="square" lIns="0" tIns="0" rIns="0" bIns="0" anchor="ctr" anchorCtr="1"/>
+        <a:lstStyle/>
+        <a:p>
+          <a:pPr algn="ctr" rtl="0">
+            <a:defRPr/>
+          </a:pPr>
+          <a:r>
+            <a:rPr lang="en-US" sz="1400" b="0" i="0" u="none" strike="noStrike" baseline="0">
+              <a:solidFill>
+                <a:srgbClr val="000000">
+                  <a:lumMod val="65000"/>
+                  <a:lumOff val="35000"/>
+                </a:srgbClr>
+              </a:solidFill>
+              <a:latin typeface="Arial"/>
+              <a:cs typeface="Arial"/>
+            </a:rPr>
+            <a:t>Beginning Composite Score for 2022</a:t>
+          </a:r>
+        </a:p>
+      </cx:txPr>
+    </cx:title>
+    <cx:plotArea>
+      <cx:plotAreaRegion>
+        <cx:series layoutId="clusteredColumn" uniqueId="{7839B8C6-0AC0-4D9F-BD1F-B7ECFE0DA7F7}">
+          <cx:tx>
+            <cx:txData>
+              <cx:f>'Composite Score of 2022'!$A$1</cx:f>
+              <cx:v>Composite_Beginning</cx:v>
+            </cx:txData>
+          </cx:tx>
+          <cx:dataPt idx="0">
+            <cx:spPr>
+              <a:solidFill>
+                <a:srgbClr val="C00000"/>
+              </a:solidFill>
+            </cx:spPr>
+          </cx:dataPt>
+          <cx:dataPt idx="1">
+            <cx:spPr>
+              <a:solidFill>
+                <a:srgbClr val="FFFF00"/>
+              </a:solidFill>
+            </cx:spPr>
+          </cx:dataPt>
+          <cx:dataLabels>
+            <cx:visibility seriesName="0" categoryName="0" value="1"/>
+          </cx:dataLabels>
+          <cx:dataId val="0"/>
+          <cx:layoutPr>
+            <cx:binning intervalClosed="r"/>
+          </cx:layoutPr>
+        </cx:series>
+      </cx:plotAreaRegion>
+      <cx:axis id="0">
+        <cx:catScaling gapWidth="0"/>
+        <cx:title>
+          <cx:tx>
+            <cx:txData>
+              <cx:v>Beginning Composite Score Range</cx:v>
+            </cx:txData>
+          </cx:tx>
+          <cx:txPr>
+            <a:bodyPr spcFirstLastPara="1" vertOverflow="ellipsis" horzOverflow="overflow" wrap="square" lIns="0" tIns="0" rIns="0" bIns="0" anchor="ctr" anchorCtr="1"/>
+            <a:lstStyle/>
+            <a:p>
+              <a:pPr algn="ctr" rtl="0">
+                <a:defRPr/>
+              </a:pPr>
+              <a:r>
+                <a:rPr lang="en-US" sz="900" b="0" i="0" u="none" strike="noStrike" baseline="0">
+                  <a:solidFill>
+                    <a:srgbClr val="000000">
+                      <a:lumMod val="65000"/>
+                      <a:lumOff val="35000"/>
+                    </a:srgbClr>
+                  </a:solidFill>
+                  <a:latin typeface="Arial"/>
+                  <a:cs typeface="Arial"/>
+                </a:rPr>
+                <a:t>Beginning Composite Score Range</a:t>
+              </a:r>
+            </a:p>
+          </cx:txPr>
+        </cx:title>
+        <cx:tickLabels/>
+      </cx:axis>
+      <cx:axis id="1">
+        <cx:valScaling/>
+        <cx:title>
+          <cx:tx>
+            <cx:txData>
+              <cx:v>Number of Students </cx:v>
+            </cx:txData>
+          </cx:tx>
+          <cx:txPr>
+            <a:bodyPr spcFirstLastPara="1" vertOverflow="ellipsis" horzOverflow="overflow" wrap="square" lIns="0" tIns="0" rIns="0" bIns="0" anchor="ctr" anchorCtr="1"/>
+            <a:lstStyle/>
+            <a:p>
+              <a:pPr algn="ctr" rtl="0">
+                <a:defRPr/>
+              </a:pPr>
+              <a:r>
+                <a:rPr lang="en-US" sz="900" b="0" i="0" u="none" strike="noStrike" baseline="0">
+                  <a:solidFill>
+                    <a:srgbClr val="000000">
+                      <a:lumMod val="65000"/>
+                      <a:lumOff val="35000"/>
+                    </a:srgbClr>
+                  </a:solidFill>
+                  <a:latin typeface="Arial"/>
+                  <a:cs typeface="Arial"/>
+                </a:rPr>
+                <a:t>Number of Students </a:t>
+              </a:r>
+            </a:p>
+          </cx:txPr>
+        </cx:title>
+        <cx:majorGridlines/>
+        <cx:tickLabels/>
+      </cx:axis>
+    </cx:plotArea>
+  </cx:chart>
+</cx:chartSpace>
+</file>
+
+<file path=ppt/charts/chartEx2.xml><?xml version="1.0" encoding="utf-8"?>
+<cx:chartSpace xmlns:a="http://schemas.openxmlformats.org/drawingml/2006/main" xmlns:r="http://schemas.openxmlformats.org/officeDocument/2006/relationships" xmlns:cx="http://schemas.microsoft.com/office/drawing/2014/chartex">
+  <cx:chartData>
+    <cx:externalData r:id="rId1" cx:autoUpdate="0"/>
+    <cx:data id="0">
+      <cx:numDim type="val">
+        <cx:f>'Composite Score of 2022'!$B$2:$B$150</cx:f>
+        <cx:lvl ptCount="149" formatCode="General">
+          <cx:pt idx="0">358</cx:pt>
+          <cx:pt idx="1">362</cx:pt>
+          <cx:pt idx="2">413</cx:pt>
+          <cx:pt idx="3">369</cx:pt>
+          <cx:pt idx="4">387</cx:pt>
+          <cx:pt idx="5">370</cx:pt>
+          <cx:pt idx="6">373</cx:pt>
+          <cx:pt idx="7">370</cx:pt>
+          <cx:pt idx="8">372</cx:pt>
+          <cx:pt idx="9">371</cx:pt>
+          <cx:pt idx="10">401</cx:pt>
+          <cx:pt idx="11">371</cx:pt>
+          <cx:pt idx="12">384</cx:pt>
+          <cx:pt idx="13">384</cx:pt>
+          <cx:pt idx="14">378</cx:pt>
+          <cx:pt idx="15">392</cx:pt>
+          <cx:pt idx="16">375</cx:pt>
+          <cx:pt idx="17">395</cx:pt>
+          <cx:pt idx="18">393</cx:pt>
+          <cx:pt idx="19">380</cx:pt>
+          <cx:pt idx="20">373</cx:pt>
+          <cx:pt idx="21">399</cx:pt>
+          <cx:pt idx="22">377</cx:pt>
+          <cx:pt idx="23">381</cx:pt>
+          <cx:pt idx="24">386</cx:pt>
+          <cx:pt idx="25">398</cx:pt>
+          <cx:pt idx="26">378</cx:pt>
+          <cx:pt idx="27">396</cx:pt>
+          <cx:pt idx="28">405</cx:pt>
+          <cx:pt idx="29">404</cx:pt>
+          <cx:pt idx="30">395</cx:pt>
+          <cx:pt idx="31">415</cx:pt>
+          <cx:pt idx="32">390</cx:pt>
+          <cx:pt idx="33">408</cx:pt>
+          <cx:pt idx="34">395</cx:pt>
+          <cx:pt idx="35">409</cx:pt>
+          <cx:pt idx="36">459</cx:pt>
+          <cx:pt idx="37">409</cx:pt>
+          <cx:pt idx="38">399</cx:pt>
+          <cx:pt idx="39">407</cx:pt>
+          <cx:pt idx="40">428</cx:pt>
+          <cx:pt idx="41">412</cx:pt>
+          <cx:pt idx="42">440</cx:pt>
+          <cx:pt idx="43">418</cx:pt>
+          <cx:pt idx="44">403</cx:pt>
+          <cx:pt idx="45">404</cx:pt>
+          <cx:pt idx="46">416</cx:pt>
+          <cx:pt idx="47">407</cx:pt>
+          <cx:pt idx="48">396</cx:pt>
+          <cx:pt idx="49">419</cx:pt>
+          <cx:pt idx="50">385</cx:pt>
+          <cx:pt idx="51">419</cx:pt>
+          <cx:pt idx="52">414</cx:pt>
+          <cx:pt idx="53">427</cx:pt>
+          <cx:pt idx="54">425</cx:pt>
+          <cx:pt idx="55">443</cx:pt>
+          <cx:pt idx="56">405</cx:pt>
+          <cx:pt idx="57">448</cx:pt>
+          <cx:pt idx="58">408</cx:pt>
+          <cx:pt idx="59">417</cx:pt>
+          <cx:pt idx="60">426</cx:pt>
+          <cx:pt idx="61">428</cx:pt>
+          <cx:pt idx="62">451</cx:pt>
+          <cx:pt idx="63">442</cx:pt>
+          <cx:pt idx="64">433</cx:pt>
+          <cx:pt idx="65">417</cx:pt>
+          <cx:pt idx="66">432</cx:pt>
+          <cx:pt idx="67">428</cx:pt>
+          <cx:pt idx="68">454</cx:pt>
+          <cx:pt idx="69">424</cx:pt>
+          <cx:pt idx="70">432</cx:pt>
+          <cx:pt idx="71">425</cx:pt>
+          <cx:pt idx="72">433</cx:pt>
+          <cx:pt idx="73">411</cx:pt>
+          <cx:pt idx="74">437</cx:pt>
+          <cx:pt idx="75">446</cx:pt>
+          <cx:pt idx="76">425</cx:pt>
+          <cx:pt idx="77">447</cx:pt>
+          <cx:pt idx="78">428</cx:pt>
+          <cx:pt idx="79">433</cx:pt>
+          <cx:pt idx="80">455</cx:pt>
+          <cx:pt idx="81">454</cx:pt>
+          <cx:pt idx="82">434</cx:pt>
+          <cx:pt idx="83">423</cx:pt>
+          <cx:pt idx="84">433</cx:pt>
+          <cx:pt idx="85">443</cx:pt>
+          <cx:pt idx="86">422</cx:pt>
+          <cx:pt idx="87">451</cx:pt>
+          <cx:pt idx="88">439</cx:pt>
+          <cx:pt idx="89">435</cx:pt>
+          <cx:pt idx="90">443</cx:pt>
+          <cx:pt idx="91">452</cx:pt>
+          <cx:pt idx="92">443</cx:pt>
+          <cx:pt idx="93">544</cx:pt>
+          <cx:pt idx="94">443</cx:pt>
+          <cx:pt idx="95">455</cx:pt>
+          <cx:pt idx="96">441</cx:pt>
+          <cx:pt idx="97">444</cx:pt>
+          <cx:pt idx="98">478</cx:pt>
+          <cx:pt idx="99">453</cx:pt>
+          <cx:pt idx="100">453</cx:pt>
+          <cx:pt idx="101">464</cx:pt>
+          <cx:pt idx="102">455</cx:pt>
+          <cx:pt idx="103">440</cx:pt>
+          <cx:pt idx="104">463</cx:pt>
+          <cx:pt idx="105">445</cx:pt>
+          <cx:pt idx="106">454</cx:pt>
+          <cx:pt idx="107">463</cx:pt>
+          <cx:pt idx="108">488</cx:pt>
+          <cx:pt idx="109">504</cx:pt>
+          <cx:pt idx="110">447</cx:pt>
+          <cx:pt idx="111">484</cx:pt>
+          <cx:pt idx="112">450</cx:pt>
+          <cx:pt idx="113">462</cx:pt>
+          <cx:pt idx="114">463</cx:pt>
+          <cx:pt idx="115">449</cx:pt>
+          <cx:pt idx="116">434</cx:pt>
+          <cx:pt idx="117">449</cx:pt>
+          <cx:pt idx="118">488</cx:pt>
+          <cx:pt idx="119">461</cx:pt>
+          <cx:pt idx="120">470</cx:pt>
+          <cx:pt idx="121">460</cx:pt>
+          <cx:pt idx="122">468</cx:pt>
+          <cx:pt idx="123">483</cx:pt>
+          <cx:pt idx="124">454</cx:pt>
+          <cx:pt idx="125">477</cx:pt>
+          <cx:pt idx="126">509</cx:pt>
+          <cx:pt idx="127">485</cx:pt>
+          <cx:pt idx="128">496</cx:pt>
+          <cx:pt idx="129">544</cx:pt>
+          <cx:pt idx="130">480</cx:pt>
+          <cx:pt idx="131">492</cx:pt>
+          <cx:pt idx="132">486</cx:pt>
+          <cx:pt idx="133">511</cx:pt>
+          <cx:pt idx="134">510</cx:pt>
+          <cx:pt idx="135">485</cx:pt>
+          <cx:pt idx="136">519</cx:pt>
+          <cx:pt idx="137">501</cx:pt>
+          <cx:pt idx="138">525</cx:pt>
+          <cx:pt idx="139">558</cx:pt>
+          <cx:pt idx="140">387</cx:pt>
+          <cx:pt idx="141">369</cx:pt>
+          <cx:pt idx="142">431</cx:pt>
+          <cx:pt idx="143">363</cx:pt>
+          <cx:pt idx="144">425</cx:pt>
+          <cx:pt idx="145">412</cx:pt>
+          <cx:pt idx="146">388</cx:pt>
+          <cx:pt idx="147">414</cx:pt>
+          <cx:pt idx="148">458</cx:pt>
+        </cx:lvl>
+      </cx:numDim>
+    </cx:data>
+  </cx:chartData>
+  <cx:chart>
+    <cx:title pos="t" align="ctr" overlay="0">
+      <cx:tx>
+        <cx:txData>
+          <cx:v>End Composite Score for 2022</cx:v>
+        </cx:txData>
+      </cx:tx>
+      <cx:txPr>
+        <a:bodyPr spcFirstLastPara="1" vertOverflow="ellipsis" horzOverflow="overflow" wrap="square" lIns="0" tIns="0" rIns="0" bIns="0" anchor="ctr" anchorCtr="1"/>
+        <a:lstStyle/>
+        <a:p>
+          <a:pPr algn="ctr" rtl="0">
+            <a:defRPr/>
+          </a:pPr>
+          <a:r>
+            <a:rPr lang="en-US" sz="1400" b="0" i="0" u="none" strike="noStrike" baseline="0">
+              <a:solidFill>
+                <a:srgbClr val="000000">
+                  <a:lumMod val="65000"/>
+                  <a:lumOff val="35000"/>
+                </a:srgbClr>
+              </a:solidFill>
+              <a:latin typeface="Arial"/>
+              <a:cs typeface="Arial"/>
+            </a:rPr>
+            <a:t>End Composite Score for 2022</a:t>
+          </a:r>
+        </a:p>
+      </cx:txPr>
+    </cx:title>
+    <cx:plotArea>
+      <cx:plotAreaRegion>
+        <cx:series layoutId="clusteredColumn" uniqueId="{804FF728-FA49-4730-A194-E81F18E1B49D}">
+          <cx:tx>
+            <cx:txData>
+              <cx:f>'Composite Score of 2022'!$B$1</cx:f>
+              <cx:v>Composite_End</cx:v>
+            </cx:txData>
+          </cx:tx>
+          <cx:dataPt idx="0">
+            <cx:spPr>
+              <a:solidFill>
+                <a:srgbClr val="C00000"/>
+              </a:solidFill>
+            </cx:spPr>
+          </cx:dataPt>
+          <cx:dataPt idx="1">
+            <cx:spPr>
+              <a:solidFill>
+                <a:srgbClr val="FFFF00"/>
+              </a:solidFill>
+            </cx:spPr>
+          </cx:dataPt>
+          <cx:dataPt idx="2">
+            <cx:spPr>
+              <a:solidFill>
+                <a:srgbClr val="00B050"/>
+              </a:solidFill>
+            </cx:spPr>
+          </cx:dataPt>
+          <cx:dataLabels>
+            <cx:visibility seriesName="0" categoryName="0" value="1"/>
+          </cx:dataLabels>
+          <cx:dataId val="0"/>
+          <cx:layoutPr>
+            <cx:binning intervalClosed="r"/>
+          </cx:layoutPr>
+        </cx:series>
+      </cx:plotAreaRegion>
+      <cx:axis id="0">
+        <cx:catScaling gapWidth="0"/>
+        <cx:title>
+          <cx:tx>
+            <cx:txData>
+              <cx:v>End Composite Score Range</cx:v>
+            </cx:txData>
+          </cx:tx>
+          <cx:txPr>
+            <a:bodyPr spcFirstLastPara="1" vertOverflow="ellipsis" horzOverflow="overflow" wrap="square" lIns="0" tIns="0" rIns="0" bIns="0" anchor="ctr" anchorCtr="1"/>
+            <a:lstStyle/>
+            <a:p>
+              <a:pPr algn="ctr" rtl="0">
+                <a:defRPr/>
+              </a:pPr>
+              <a:r>
+                <a:rPr lang="en-US" sz="900" b="0" i="0" u="none" strike="noStrike" baseline="0">
+                  <a:solidFill>
+                    <a:srgbClr val="000000">
+                      <a:lumMod val="65000"/>
+                      <a:lumOff val="35000"/>
+                    </a:srgbClr>
+                  </a:solidFill>
+                  <a:latin typeface="Arial"/>
+                  <a:cs typeface="Arial"/>
+                </a:rPr>
+                <a:t>End Composite Score Range</a:t>
+              </a:r>
+            </a:p>
+          </cx:txPr>
+        </cx:title>
+        <cx:tickLabels/>
+      </cx:axis>
+      <cx:axis id="1">
+        <cx:valScaling/>
+        <cx:title>
+          <cx:tx>
+            <cx:txData>
+              <cx:v>Number of Students</cx:v>
+            </cx:txData>
+          </cx:tx>
+          <cx:txPr>
+            <a:bodyPr spcFirstLastPara="1" vertOverflow="ellipsis" horzOverflow="overflow" wrap="square" lIns="0" tIns="0" rIns="0" bIns="0" anchor="ctr" anchorCtr="1"/>
+            <a:lstStyle/>
+            <a:p>
+              <a:pPr algn="ctr" rtl="0">
+                <a:defRPr/>
+              </a:pPr>
+              <a:r>
+                <a:rPr lang="en-US" sz="900" b="0" i="0" u="none" strike="noStrike" baseline="0">
+                  <a:solidFill>
+                    <a:srgbClr val="000000">
+                      <a:lumMod val="65000"/>
+                      <a:lumOff val="35000"/>
+                    </a:srgbClr>
+                  </a:solidFill>
+                  <a:latin typeface="Arial"/>
+                  <a:cs typeface="Arial"/>
+                </a:rPr>
+                <a:t>Number of Students</a:t>
+              </a:r>
+            </a:p>
+          </cx:txPr>
+        </cx:title>
+        <cx:majorGridlines/>
+        <cx:tickLabels/>
+      </cx:axis>
+    </cx:plotArea>
+  </cx:chart>
+</cx:chartSpace>
+</file>
+
+<file path=ppt/charts/colors1.xml><?xml version="1.0" encoding="utf-8"?>
+<cs:colorStyle xmlns:cs="http://schemas.microsoft.com/office/drawing/2012/chartStyle" xmlns:a="http://schemas.openxmlformats.org/drawingml/2006/main" meth="cycle" id="10">
+  <a:schemeClr val="accent1"/>
+  <a:schemeClr val="accent2"/>
+  <a:schemeClr val="accent3"/>
+  <a:schemeClr val="accent4"/>
+  <a:schemeClr val="accent5"/>
+  <a:schemeClr val="accent6"/>
+  <cs:variation/>
+  <cs:variation>
+    <a:lumMod val="60000"/>
+  </cs:variation>
+  <cs:variation>
+    <a:lumMod val="80000"/>
+    <a:lumOff val="20000"/>
+  </cs:variation>
+  <cs:variation>
+    <a:lumMod val="80000"/>
+  </cs:variation>
+  <cs:variation>
+    <a:lumMod val="60000"/>
+    <a:lumOff val="40000"/>
+  </cs:variation>
+  <cs:variation>
+    <a:lumMod val="50000"/>
+  </cs:variation>
+  <cs:variation>
+    <a:lumMod val="70000"/>
+    <a:lumOff val="30000"/>
+  </cs:variation>
+  <cs:variation>
+    <a:lumMod val="70000"/>
+  </cs:variation>
+  <cs:variation>
+    <a:lumMod val="50000"/>
+    <a:lumOff val="50000"/>
+  </cs:variation>
+</cs:colorStyle>
+</file>
+
+<file path=ppt/charts/colors2.xml><?xml version="1.0" encoding="utf-8"?>
+<cs:colorStyle xmlns:cs="http://schemas.microsoft.com/office/drawing/2012/chartStyle" xmlns:a="http://schemas.openxmlformats.org/drawingml/2006/main" meth="cycle" id="10">
+  <a:schemeClr val="accent1"/>
+  <a:schemeClr val="accent2"/>
+  <a:schemeClr val="accent3"/>
+  <a:schemeClr val="accent4"/>
+  <a:schemeClr val="accent5"/>
+  <a:schemeClr val="accent6"/>
+  <cs:variation/>
+  <cs:variation>
+    <a:lumMod val="60000"/>
+  </cs:variation>
+  <cs:variation>
+    <a:lumMod val="80000"/>
+    <a:lumOff val="20000"/>
+  </cs:variation>
+  <cs:variation>
+    <a:lumMod val="80000"/>
+  </cs:variation>
+  <cs:variation>
+    <a:lumMod val="60000"/>
+    <a:lumOff val="40000"/>
+  </cs:variation>
+  <cs:variation>
+    <a:lumMod val="50000"/>
+  </cs:variation>
+  <cs:variation>
+    <a:lumMod val="70000"/>
+    <a:lumOff val="30000"/>
+  </cs:variation>
+  <cs:variation>
+    <a:lumMod val="70000"/>
+  </cs:variation>
+  <cs:variation>
+    <a:lumMod val="50000"/>
+    <a:lumOff val="50000"/>
+  </cs:variation>
+</cs:colorStyle>
+</file>
+
+<file path=ppt/charts/style1.xml><?xml version="1.0" encoding="utf-8"?>
+<cs:chartStyle xmlns:cs="http://schemas.microsoft.com/office/drawing/2012/chartStyle" xmlns:a="http://schemas.openxmlformats.org/drawingml/2006/main" id="366">
+  <cs:axisTitle>
+    <cs:lnRef idx="0"/>
+    <cs:fillRef idx="0"/>
+    <cs:effectRef idx="0"/>
+    <cs:fontRef idx="minor">
+      <a:schemeClr val="tx1">
+        <a:lumMod val="65000"/>
+        <a:lumOff val="35000"/>
+      </a:schemeClr>
+    </cs:fontRef>
+    <cs:defRPr sz="900"/>
+  </cs:axisTitle>
+  <cs:categoryAxis>
+    <cs:lnRef idx="0"/>
+    <cs:fillRef idx="0"/>
+    <cs:effectRef idx="0"/>
+    <cs:fontRef idx="minor">
+      <a:schemeClr val="tx1">
+        <a:lumMod val="65000"/>
+        <a:lumOff val="35000"/>
+      </a:schemeClr>
+    </cs:fontRef>
+    <cs:spPr>
+      <a:ln w="9525" cap="flat" cmpd="sng" algn="ctr">
+        <a:solidFill>
+          <a:schemeClr val="tx1">
+            <a:lumMod val="15000"/>
+            <a:lumOff val="85000"/>
+          </a:schemeClr>
+        </a:solidFill>
+        <a:round/>
+      </a:ln>
+    </cs:spPr>
+    <cs:defRPr sz="900"/>
+  </cs:categoryAxis>
+  <cs:chartArea mods="allowNoFillOverride allowNoLineOverride">
+    <cs:lnRef idx="0"/>
+    <cs:fillRef idx="0"/>
+    <cs:effectRef idx="0"/>
+    <cs:fontRef idx="minor">
+      <a:schemeClr val="tx1"/>
+    </cs:fontRef>
+    <cs:spPr>
+      <a:solidFill>
+        <a:schemeClr val="bg1"/>
+      </a:solidFill>
+      <a:ln w="9525" cap="flat" cmpd="sng" algn="ctr">
+        <a:solidFill>
+          <a:schemeClr val="tx1">
+            <a:lumMod val="15000"/>
+            <a:lumOff val="85000"/>
+          </a:schemeClr>
+        </a:solidFill>
+        <a:round/>
+      </a:ln>
+    </cs:spPr>
+    <cs:defRPr sz="1000"/>
+  </cs:chartArea>
+  <cs:dataLabel>
+    <cs:lnRef idx="0"/>
+    <cs:fillRef idx="0"/>
+    <cs:effectRef idx="0"/>
+    <cs:fontRef idx="minor">
+      <a:schemeClr val="tx1">
+        <a:lumMod val="65000"/>
+        <a:lumOff val="35000"/>
+      </a:schemeClr>
+    </cs:fontRef>
+    <cs:defRPr sz="900"/>
+  </cs:dataLabel>
+  <cs:dataLabelCallout>
+    <cs:lnRef idx="0"/>
+    <cs:fillRef idx="0"/>
+    <cs:effectRef idx="0"/>
+    <cs:fontRef idx="minor">
+      <a:schemeClr val="dk1">
+        <a:lumMod val="65000"/>
+        <a:lumOff val="35000"/>
+      </a:schemeClr>
+    </cs:fontRef>
+    <cs:spPr>
+      <a:solidFill>
+        <a:schemeClr val="lt1"/>
+      </a:solidFill>
+      <a:ln>
+        <a:solidFill>
+          <a:schemeClr val="dk1">
+            <a:lumMod val="25000"/>
+            <a:lumOff val="75000"/>
+          </a:schemeClr>
+        </a:solidFill>
+      </a:ln>
+    </cs:spPr>
+    <cs:defRPr sz="900"/>
+    <cs:bodyPr rot="0" spcFirstLastPara="1" vertOverflow="clip" horzOverflow="clip" vert="horz" wrap="square" lIns="36576" tIns="18288" rIns="36576" bIns="18288" anchor="ctr" anchorCtr="1">
+      <a:spAutoFit/>
+    </cs:bodyPr>
+  </cs:dataLabelCallout>
+  <cs:dataPoint>
+    <cs:lnRef idx="0"/>
+    <cs:fillRef idx="0">
+      <cs:styleClr val="auto"/>
+    </cs:fillRef>
+    <cs:effectRef idx="0"/>
+    <cs:fontRef idx="minor">
+      <a:schemeClr val="tx1"/>
+    </cs:fontRef>
+    <cs:spPr>
+      <a:solidFill>
+        <a:schemeClr val="phClr"/>
+      </a:solidFill>
+    </cs:spPr>
+  </cs:dataPoint>
+  <cs:dataPoint3D>
+    <cs:lnRef idx="0"/>
+    <cs:fillRef idx="0">
+      <cs:styleClr val="auto"/>
+    </cs:fillRef>
+    <cs:effectRef idx="0"/>
+    <cs:fontRef idx="minor">
+      <a:schemeClr val="tx1"/>
+    </cs:fontRef>
+    <cs:spPr>
+      <a:solidFill>
+        <a:schemeClr val="phClr"/>
+      </a:solidFill>
+    </cs:spPr>
+  </cs:dataPoint3D>
+  <cs:dataPointLine>
+    <cs:lnRef idx="0">
+      <cs:styleClr val="auto"/>
+    </cs:lnRef>
+    <cs:fillRef idx="0"/>
+    <cs:effectRef idx="0"/>
+    <cs:fontRef idx="minor">
+      <a:schemeClr val="tx1"/>
+    </cs:fontRef>
+    <cs:spPr>
+      <a:ln w="28575" cap="rnd">
+        <a:solidFill>
+          <a:schemeClr val="phClr"/>
+        </a:solidFill>
+        <a:round/>
+      </a:ln>
+    </cs:spPr>
+  </cs:dataPointLine>
+  <cs:dataPointMarker>
+    <cs:lnRef idx="0"/>
+    <cs:fillRef idx="0">
+      <cs:styleClr val="auto"/>
+    </cs:fillRef>
+    <cs:effectRef idx="0"/>
+    <cs:fontRef idx="minor">
+      <a:schemeClr val="tx1"/>
+    </cs:fontRef>
+    <cs:spPr>
+      <a:solidFill>
+        <a:schemeClr val="phClr"/>
+      </a:solidFill>
+      <a:ln w="9525">
+        <a:solidFill>
+          <a:schemeClr val="lt1"/>
+        </a:solidFill>
+      </a:ln>
+    </cs:spPr>
+  </cs:dataPointMarker>
+  <cs:dataPointMarkerLayout symbol="circle" size="5"/>
+  <cs:dataPointWireframe>
+    <cs:lnRef idx="0">
+      <cs:styleClr val="auto"/>
+    </cs:lnRef>
+    <cs:fillRef idx="0"/>
+    <cs:effectRef idx="0"/>
+    <cs:fontRef idx="minor">
+      <a:schemeClr val="tx1"/>
+    </cs:fontRef>
+    <cs:spPr>
+      <a:ln w="28575" cap="rnd">
+        <a:solidFill>
+          <a:schemeClr val="phClr"/>
+        </a:solidFill>
+        <a:round/>
+      </a:ln>
+    </cs:spPr>
+  </cs:dataPointWireframe>
+  <cs:dataTable>
+    <cs:lnRef idx="0"/>
+    <cs:fillRef idx="0"/>
+    <cs:effectRef idx="0"/>
+    <cs:fontRef idx="minor">
+      <a:schemeClr val="tx1">
+        <a:lumMod val="65000"/>
+        <a:lumOff val="35000"/>
+      </a:schemeClr>
+    </cs:fontRef>
+    <cs:spPr>
+      <a:ln w="9525">
+        <a:solidFill>
+          <a:schemeClr val="tx1">
+            <a:lumMod val="15000"/>
+            <a:lumOff val="85000"/>
+          </a:schemeClr>
+        </a:solidFill>
+      </a:ln>
+    </cs:spPr>
+    <cs:defRPr sz="900"/>
+  </cs:dataTable>
+  <cs:downBar>
+    <cs:lnRef idx="0"/>
+    <cs:fillRef idx="0"/>
+    <cs:effectRef idx="0"/>
+    <cs:fontRef idx="minor">
+      <a:schemeClr val="dk1"/>
+    </cs:fontRef>
+    <cs:spPr>
+      <a:solidFill>
+        <a:schemeClr val="dk1">
+          <a:lumMod val="65000"/>
+          <a:lumOff val="35000"/>
+        </a:schemeClr>
+      </a:solidFill>
+      <a:ln w="9525">
+        <a:solidFill>
+          <a:schemeClr val="tx1">
+            <a:lumMod val="65000"/>
+            <a:lumOff val="35000"/>
+          </a:schemeClr>
+        </a:solidFill>
+      </a:ln>
+    </cs:spPr>
+  </cs:downBar>
+  <cs:dropLine>
+    <cs:lnRef idx="0"/>
+    <cs:fillRef idx="0"/>
+    <cs:effectRef idx="0"/>
+    <cs:fontRef idx="minor">
+      <a:schemeClr val="tx1"/>
+    </cs:fontRef>
+    <cs:spPr>
+      <a:ln w="9525" cap="flat" cmpd="sng" algn="ctr">
+        <a:solidFill>
+          <a:schemeClr val="tx1">
+            <a:lumMod val="35000"/>
+            <a:lumOff val="65000"/>
+          </a:schemeClr>
+        </a:solidFill>
+        <a:round/>
+      </a:ln>
+    </cs:spPr>
+  </cs:dropLine>
+  <cs:errorBar>
+    <cs:lnRef idx="0"/>
+    <cs:fillRef idx="0"/>
+    <cs:effectRef idx="0"/>
+    <cs:fontRef idx="minor">
+      <a:schemeClr val="tx1"/>
+    </cs:fontRef>
+    <cs:spPr>
+      <a:ln w="9525" cap="flat" cmpd="sng" algn="ctr">
+        <a:solidFill>
+          <a:schemeClr val="tx1">
+            <a:lumMod val="65000"/>
+            <a:lumOff val="35000"/>
+          </a:schemeClr>
+        </a:solidFill>
+        <a:round/>
+      </a:ln>
+    </cs:spPr>
+  </cs:errorBar>
+  <cs:floor>
+    <cs:lnRef idx="0"/>
+    <cs:fillRef idx="0"/>
+    <cs:effectRef idx="0"/>
+    <cs:fontRef idx="minor">
+      <a:schemeClr val="tx1"/>
+    </cs:fontRef>
+  </cs:floor>
+  <cs:gridlineMajor>
+    <cs:lnRef idx="0"/>
+    <cs:fillRef idx="0"/>
+    <cs:effectRef idx="0"/>
+    <cs:fontRef idx="minor">
+      <a:schemeClr val="tx1"/>
+    </cs:fontRef>
+    <cs:spPr>
+      <a:ln w="9525" cap="flat" cmpd="sng" algn="ctr">
+        <a:solidFill>
+          <a:schemeClr val="tx1">
+            <a:lumMod val="15000"/>
+            <a:lumOff val="85000"/>
+          </a:schemeClr>
+        </a:solidFill>
+        <a:round/>
+      </a:ln>
+    </cs:spPr>
+  </cs:gridlineMajor>
+  <cs:gridlineMinor>
+    <cs:lnRef idx="0"/>
+    <cs:fillRef idx="0"/>
+    <cs:effectRef idx="0"/>
+    <cs:fontRef idx="minor">
+      <a:schemeClr val="tx1"/>
+    </cs:fontRef>
+    <cs:spPr>
+      <a:ln w="9525" cap="flat" cmpd="sng" algn="ctr">
+        <a:solidFill>
+          <a:schemeClr val="tx1">
+            <a:lumMod val="15000"/>
+            <a:lumOff val="85000"/>
+          </a:schemeClr>
+        </a:solidFill>
+        <a:round/>
+      </a:ln>
+    </cs:spPr>
+  </cs:gridlineMinor>
+  <cs:hiLoLine>
+    <cs:lnRef idx="0"/>
+    <cs:fillRef idx="0"/>
+    <cs:effectRef idx="0"/>
+    <cs:fontRef idx="minor">
+      <a:schemeClr val="tx1"/>
+    </cs:fontRef>
+    <cs:spPr>
+      <a:ln w="9525" cap="flat" cmpd="sng" algn="ctr">
+        <a:solidFill>
+          <a:schemeClr val="tx1">
+            <a:lumMod val="75000"/>
+            <a:lumOff val="25000"/>
+          </a:schemeClr>
+        </a:solidFill>
+        <a:round/>
+      </a:ln>
+    </cs:spPr>
+  </cs:hiLoLine>
+  <cs:leaderLine>
+    <cs:lnRef idx="0"/>
+    <cs:fillRef idx="0"/>
+    <cs:effectRef idx="0"/>
+    <cs:fontRef idx="minor">
+      <a:schemeClr val="tx1"/>
+    </cs:fontRef>
+    <cs:spPr>
+      <a:ln w="9525" cap="flat" cmpd="sng" algn="ctr">
+        <a:solidFill>
+          <a:schemeClr val="tx1">
+            <a:lumMod val="35000"/>
+            <a:lumOff val="65000"/>
+          </a:schemeClr>
+        </a:solidFill>
+        <a:round/>
+      </a:ln>
+    </cs:spPr>
+  </cs:leaderLine>
+  <cs:legend>
+    <cs:lnRef idx="0"/>
+    <cs:fillRef idx="0"/>
+    <cs:effectRef idx="0"/>
+    <cs:fontRef idx="minor">
+      <a:schemeClr val="tx1">
+        <a:lumMod val="65000"/>
+        <a:lumOff val="35000"/>
+      </a:schemeClr>
+    </cs:fontRef>
+    <cs:defRPr sz="900"/>
+  </cs:legend>
+  <cs:plotArea mods="allowNoFillOverride allowNoLineOverride">
+    <cs:lnRef idx="0"/>
+    <cs:fillRef idx="0"/>
+    <cs:effectRef idx="0"/>
+    <cs:fontRef idx="minor">
+      <a:schemeClr val="tx1"/>
+    </cs:fontRef>
+  </cs:plotArea>
+  <cs:plotArea3D mods="allowNoFillOverride allowNoLineOverride">
+    <cs:lnRef idx="0"/>
+    <cs:fillRef idx="0"/>
+    <cs:effectRef idx="0"/>
+    <cs:fontRef idx="minor">
+      <a:schemeClr val="tx1"/>
+    </cs:fontRef>
+  </cs:plotArea3D>
+  <cs:seriesAxis>
+    <cs:lnRef idx="0"/>
+    <cs:fillRef idx="0"/>
+    <cs:effectRef idx="0"/>
+    <cs:fontRef idx="minor">
+      <a:schemeClr val="tx1">
+        <a:lumMod val="65000"/>
+        <a:lumOff val="35000"/>
+      </a:schemeClr>
+    </cs:fontRef>
+    <cs:spPr>
+      <a:ln w="9525" cap="flat" cmpd="sng" algn="ctr">
+        <a:solidFill>
+          <a:schemeClr val="tx1">
+            <a:lumMod val="15000"/>
+            <a:lumOff val="85000"/>
+          </a:schemeClr>
+        </a:solidFill>
+        <a:round/>
+      </a:ln>
+    </cs:spPr>
+    <cs:defRPr sz="900"/>
+  </cs:seriesAxis>
+  <cs:seriesLine>
+    <cs:lnRef idx="0"/>
+    <cs:fillRef idx="0"/>
+    <cs:effectRef idx="0"/>
+    <cs:fontRef idx="minor">
+      <a:schemeClr val="tx1"/>
+    </cs:fontRef>
+    <cs:spPr>
+      <a:ln w="9525" cap="flat">
+        <a:solidFill>
+          <a:srgbClr val="D9D9D9"/>
+        </a:solidFill>
+        <a:round/>
+      </a:ln>
+    </cs:spPr>
+  </cs:seriesLine>
+  <cs:title>
+    <cs:lnRef idx="0"/>
+    <cs:fillRef idx="0"/>
+    <cs:effectRef idx="0"/>
+    <cs:fontRef idx="minor">
+      <a:schemeClr val="tx1">
+        <a:lumMod val="65000"/>
+        <a:lumOff val="35000"/>
+      </a:schemeClr>
+    </cs:fontRef>
+    <cs:defRPr sz="1400"/>
+  </cs:title>
+  <cs:trendline>
+    <cs:lnRef idx="0">
+      <cs:styleClr val="auto"/>
+    </cs:lnRef>
+    <cs:fillRef idx="0"/>
+    <cs:effectRef idx="0"/>
+    <cs:fontRef idx="minor">
+      <a:schemeClr val="tx1"/>
+    </cs:fontRef>
+    <cs:spPr>
+      <a:ln w="19050" cap="rnd">
+        <a:solidFill>
+          <a:schemeClr val="phClr"/>
+        </a:solidFill>
+        <a:prstDash val="sysDash"/>
+      </a:ln>
+    </cs:spPr>
+  </cs:trendline>
+  <cs:trendlineLabel>
+    <cs:lnRef idx="0"/>
+    <cs:fillRef idx="0"/>
+    <cs:effectRef idx="0"/>
+    <cs:fontRef idx="minor">
+      <a:schemeClr val="tx1">
+        <a:lumMod val="65000"/>
+        <a:lumOff val="35000"/>
+      </a:schemeClr>
+    </cs:fontRef>
+    <cs:defRPr sz="900"/>
+  </cs:trendlineLabel>
+  <cs:upBar>
+    <cs:lnRef idx="0"/>
+    <cs:fillRef idx="0"/>
+    <cs:effectRef idx="0"/>
+    <cs:fontRef idx="minor">
+      <a:schemeClr val="dk1"/>
+    </cs:fontRef>
+    <cs:spPr>
+      <a:solidFill>
+        <a:schemeClr val="lt1"/>
+      </a:solidFill>
+      <a:ln w="9525">
+        <a:solidFill>
+          <a:schemeClr val="tx1">
+            <a:lumMod val="15000"/>
+            <a:lumOff val="85000"/>
+          </a:schemeClr>
+        </a:solidFill>
+      </a:ln>
+    </cs:spPr>
+  </cs:upBar>
+  <cs:valueAxis>
+    <cs:lnRef idx="0"/>
+    <cs:fillRef idx="0"/>
+    <cs:effectRef idx="0"/>
+    <cs:fontRef idx="minor">
+      <a:schemeClr val="tx1">
+        <a:lumMod val="65000"/>
+        <a:lumOff val="35000"/>
+      </a:schemeClr>
+    </cs:fontRef>
+    <cs:defRPr sz="900"/>
+  </cs:valueAxis>
+  <cs:wall>
+    <cs:lnRef idx="0"/>
+    <cs:fillRef idx="0"/>
+    <cs:effectRef idx="0"/>
+    <cs:fontRef idx="minor">
+      <a:schemeClr val="tx1"/>
+    </cs:fontRef>
+  </cs:wall>
+</cs:chartStyle>
+</file>
+
+<file path=ppt/charts/style2.xml><?xml version="1.0" encoding="utf-8"?>
+<cs:chartStyle xmlns:cs="http://schemas.microsoft.com/office/drawing/2012/chartStyle" xmlns:a="http://schemas.openxmlformats.org/drawingml/2006/main" id="366">
+  <cs:axisTitle>
+    <cs:lnRef idx="0"/>
+    <cs:fillRef idx="0"/>
+    <cs:effectRef idx="0"/>
+    <cs:fontRef idx="minor">
+      <a:schemeClr val="tx1">
+        <a:lumMod val="65000"/>
+        <a:lumOff val="35000"/>
+      </a:schemeClr>
+    </cs:fontRef>
+    <cs:defRPr sz="900"/>
+  </cs:axisTitle>
+  <cs:categoryAxis>
+    <cs:lnRef idx="0"/>
+    <cs:fillRef idx="0"/>
+    <cs:effectRef idx="0"/>
+    <cs:fontRef idx="minor">
+      <a:schemeClr val="tx1">
+        <a:lumMod val="65000"/>
+        <a:lumOff val="35000"/>
+      </a:schemeClr>
+    </cs:fontRef>
+    <cs:spPr>
+      <a:ln w="9525" cap="flat" cmpd="sng" algn="ctr">
+        <a:solidFill>
+          <a:schemeClr val="tx1">
+            <a:lumMod val="15000"/>
+            <a:lumOff val="85000"/>
+          </a:schemeClr>
+        </a:solidFill>
+        <a:round/>
+      </a:ln>
+    </cs:spPr>
+    <cs:defRPr sz="900"/>
+  </cs:categoryAxis>
+  <cs:chartArea mods="allowNoFillOverride allowNoLineOverride">
+    <cs:lnRef idx="0"/>
+    <cs:fillRef idx="0"/>
+    <cs:effectRef idx="0"/>
+    <cs:fontRef idx="minor">
+      <a:schemeClr val="tx1"/>
+    </cs:fontRef>
+    <cs:spPr>
+      <a:solidFill>
+        <a:schemeClr val="bg1"/>
+      </a:solidFill>
+      <a:ln w="9525" cap="flat" cmpd="sng" algn="ctr">
+        <a:solidFill>
+          <a:schemeClr val="tx1">
+            <a:lumMod val="15000"/>
+            <a:lumOff val="85000"/>
+          </a:schemeClr>
+        </a:solidFill>
+        <a:round/>
+      </a:ln>
+    </cs:spPr>
+    <cs:defRPr sz="1000"/>
+  </cs:chartArea>
+  <cs:dataLabel>
+    <cs:lnRef idx="0"/>
+    <cs:fillRef idx="0"/>
+    <cs:effectRef idx="0"/>
+    <cs:fontRef idx="minor">
+      <a:schemeClr val="tx1">
+        <a:lumMod val="65000"/>
+        <a:lumOff val="35000"/>
+      </a:schemeClr>
+    </cs:fontRef>
+    <cs:defRPr sz="900"/>
+  </cs:dataLabel>
+  <cs:dataLabelCallout>
+    <cs:lnRef idx="0"/>
+    <cs:fillRef idx="0"/>
+    <cs:effectRef idx="0"/>
+    <cs:fontRef idx="minor">
+      <a:schemeClr val="dk1">
+        <a:lumMod val="65000"/>
+        <a:lumOff val="35000"/>
+      </a:schemeClr>
+    </cs:fontRef>
+    <cs:spPr>
+      <a:solidFill>
+        <a:schemeClr val="lt1"/>
+      </a:solidFill>
+      <a:ln>
+        <a:solidFill>
+          <a:schemeClr val="dk1">
+            <a:lumMod val="25000"/>
+            <a:lumOff val="75000"/>
+          </a:schemeClr>
+        </a:solidFill>
+      </a:ln>
+    </cs:spPr>
+    <cs:defRPr sz="900"/>
+    <cs:bodyPr rot="0" spcFirstLastPara="1" vertOverflow="clip" horzOverflow="clip" vert="horz" wrap="square" lIns="36576" tIns="18288" rIns="36576" bIns="18288" anchor="ctr" anchorCtr="1">
+      <a:spAutoFit/>
+    </cs:bodyPr>
+  </cs:dataLabelCallout>
+  <cs:dataPoint>
+    <cs:lnRef idx="0"/>
+    <cs:fillRef idx="0">
+      <cs:styleClr val="auto"/>
+    </cs:fillRef>
+    <cs:effectRef idx="0"/>
+    <cs:fontRef idx="minor">
+      <a:schemeClr val="tx1"/>
+    </cs:fontRef>
+    <cs:spPr>
+      <a:solidFill>
+        <a:schemeClr val="phClr"/>
+      </a:solidFill>
+    </cs:spPr>
+  </cs:dataPoint>
+  <cs:dataPoint3D>
+    <cs:lnRef idx="0"/>
+    <cs:fillRef idx="0">
+      <cs:styleClr val="auto"/>
+    </cs:fillRef>
+    <cs:effectRef idx="0"/>
+    <cs:fontRef idx="minor">
+      <a:schemeClr val="tx1"/>
+    </cs:fontRef>
+    <cs:spPr>
+      <a:solidFill>
+        <a:schemeClr val="phClr"/>
+      </a:solidFill>
+    </cs:spPr>
+  </cs:dataPoint3D>
+  <cs:dataPointLine>
+    <cs:lnRef idx="0">
+      <cs:styleClr val="auto"/>
+    </cs:lnRef>
+    <cs:fillRef idx="0"/>
+    <cs:effectRef idx="0"/>
+    <cs:fontRef idx="minor">
+      <a:schemeClr val="tx1"/>
+    </cs:fontRef>
+    <cs:spPr>
+      <a:ln w="28575" cap="rnd">
+        <a:solidFill>
+          <a:schemeClr val="phClr"/>
+        </a:solidFill>
+        <a:round/>
+      </a:ln>
+    </cs:spPr>
+  </cs:dataPointLine>
+  <cs:dataPointMarker>
+    <cs:lnRef idx="0"/>
+    <cs:fillRef idx="0">
+      <cs:styleClr val="auto"/>
+    </cs:fillRef>
+    <cs:effectRef idx="0"/>
+    <cs:fontRef idx="minor">
+      <a:schemeClr val="tx1"/>
+    </cs:fontRef>
+    <cs:spPr>
+      <a:solidFill>
+        <a:schemeClr val="phClr"/>
+      </a:solidFill>
+      <a:ln w="9525">
+        <a:solidFill>
+          <a:schemeClr val="lt1"/>
+        </a:solidFill>
+      </a:ln>
+    </cs:spPr>
+  </cs:dataPointMarker>
+  <cs:dataPointMarkerLayout symbol="circle" size="5"/>
+  <cs:dataPointWireframe>
+    <cs:lnRef idx="0">
+      <cs:styleClr val="auto"/>
+    </cs:lnRef>
+    <cs:fillRef idx="0"/>
+    <cs:effectRef idx="0"/>
+    <cs:fontRef idx="minor">
+      <a:schemeClr val="tx1"/>
+    </cs:fontRef>
+    <cs:spPr>
+      <a:ln w="28575" cap="rnd">
+        <a:solidFill>
+          <a:schemeClr val="phClr"/>
+        </a:solidFill>
+        <a:round/>
+      </a:ln>
+    </cs:spPr>
+  </cs:dataPointWireframe>
+  <cs:dataTable>
+    <cs:lnRef idx="0"/>
+    <cs:fillRef idx="0"/>
+    <cs:effectRef idx="0"/>
+    <cs:fontRef idx="minor">
+      <a:schemeClr val="tx1">
+        <a:lumMod val="65000"/>
+        <a:lumOff val="35000"/>
+      </a:schemeClr>
+    </cs:fontRef>
+    <cs:spPr>
+      <a:ln w="9525">
+        <a:solidFill>
+          <a:schemeClr val="tx1">
+            <a:lumMod val="15000"/>
+            <a:lumOff val="85000"/>
+          </a:schemeClr>
+        </a:solidFill>
+      </a:ln>
+    </cs:spPr>
+    <cs:defRPr sz="900"/>
+  </cs:dataTable>
+  <cs:downBar>
+    <cs:lnRef idx="0"/>
+    <cs:fillRef idx="0"/>
+    <cs:effectRef idx="0"/>
+    <cs:fontRef idx="minor">
+      <a:schemeClr val="dk1"/>
+    </cs:fontRef>
+    <cs:spPr>
+      <a:solidFill>
+        <a:schemeClr val="dk1">
+          <a:lumMod val="65000"/>
+          <a:lumOff val="35000"/>
+        </a:schemeClr>
+      </a:solidFill>
+      <a:ln w="9525">
+        <a:solidFill>
+          <a:schemeClr val="tx1">
+            <a:lumMod val="65000"/>
+            <a:lumOff val="35000"/>
+          </a:schemeClr>
+        </a:solidFill>
+      </a:ln>
+    </cs:spPr>
+  </cs:downBar>
+  <cs:dropLine>
+    <cs:lnRef idx="0"/>
+    <cs:fillRef idx="0"/>
+    <cs:effectRef idx="0"/>
+    <cs:fontRef idx="minor">
+      <a:schemeClr val="tx1"/>
+    </cs:fontRef>
+    <cs:spPr>
+      <a:ln w="9525" cap="flat" cmpd="sng" algn="ctr">
+        <a:solidFill>
+          <a:schemeClr val="tx1">
+            <a:lumMod val="35000"/>
+            <a:lumOff val="65000"/>
+          </a:schemeClr>
+        </a:solidFill>
+        <a:round/>
+      </a:ln>
+    </cs:spPr>
+  </cs:dropLine>
+  <cs:errorBar>
+    <cs:lnRef idx="0"/>
+    <cs:fillRef idx="0"/>
+    <cs:effectRef idx="0"/>
+    <cs:fontRef idx="minor">
+      <a:schemeClr val="tx1"/>
+    </cs:fontRef>
+    <cs:spPr>
+      <a:ln w="9525" cap="flat" cmpd="sng" algn="ctr">
+        <a:solidFill>
+          <a:schemeClr val="tx1">
+            <a:lumMod val="65000"/>
+            <a:lumOff val="35000"/>
+          </a:schemeClr>
+        </a:solidFill>
+        <a:round/>
+      </a:ln>
+    </cs:spPr>
+  </cs:errorBar>
+  <cs:floor>
+    <cs:lnRef idx="0"/>
+    <cs:fillRef idx="0"/>
+    <cs:effectRef idx="0"/>
+    <cs:fontRef idx="minor">
+      <a:schemeClr val="tx1"/>
+    </cs:fontRef>
+  </cs:floor>
+  <cs:gridlineMajor>
+    <cs:lnRef idx="0"/>
+    <cs:fillRef idx="0"/>
+    <cs:effectRef idx="0"/>
+    <cs:fontRef idx="minor">
+      <a:schemeClr val="tx1"/>
+    </cs:fontRef>
+    <cs:spPr>
+      <a:ln w="9525" cap="flat" cmpd="sng" algn="ctr">
+        <a:solidFill>
+          <a:schemeClr val="tx1">
+            <a:lumMod val="15000"/>
+            <a:lumOff val="85000"/>
+          </a:schemeClr>
+        </a:solidFill>
+        <a:round/>
+      </a:ln>
+    </cs:spPr>
+  </cs:gridlineMajor>
+  <cs:gridlineMinor>
+    <cs:lnRef idx="0"/>
+    <cs:fillRef idx="0"/>
+    <cs:effectRef idx="0"/>
+    <cs:fontRef idx="minor">
+      <a:schemeClr val="tx1"/>
+    </cs:fontRef>
+    <cs:spPr>
+      <a:ln w="9525" cap="flat" cmpd="sng" algn="ctr">
+        <a:solidFill>
+          <a:schemeClr val="tx1">
+            <a:lumMod val="15000"/>
+            <a:lumOff val="85000"/>
+          </a:schemeClr>
+        </a:solidFill>
+        <a:round/>
+      </a:ln>
+    </cs:spPr>
+  </cs:gridlineMinor>
+  <cs:hiLoLine>
+    <cs:lnRef idx="0"/>
+    <cs:fillRef idx="0"/>
+    <cs:effectRef idx="0"/>
+    <cs:fontRef idx="minor">
+      <a:schemeClr val="tx1"/>
+    </cs:fontRef>
+    <cs:spPr>
+      <a:ln w="9525" cap="flat" cmpd="sng" algn="ctr">
+        <a:solidFill>
+          <a:schemeClr val="tx1">
+            <a:lumMod val="75000"/>
+            <a:lumOff val="25000"/>
+          </a:schemeClr>
+        </a:solidFill>
+        <a:round/>
+      </a:ln>
+    </cs:spPr>
+  </cs:hiLoLine>
+  <cs:leaderLine>
+    <cs:lnRef idx="0"/>
+    <cs:fillRef idx="0"/>
+    <cs:effectRef idx="0"/>
+    <cs:fontRef idx="minor">
+      <a:schemeClr val="tx1"/>
+    </cs:fontRef>
+    <cs:spPr>
+      <a:ln w="9525" cap="flat" cmpd="sng" algn="ctr">
+        <a:solidFill>
+          <a:schemeClr val="tx1">
+            <a:lumMod val="35000"/>
+            <a:lumOff val="65000"/>
+          </a:schemeClr>
+        </a:solidFill>
+        <a:round/>
+      </a:ln>
+    </cs:spPr>
+  </cs:leaderLine>
+  <cs:legend>
+    <cs:lnRef idx="0"/>
+    <cs:fillRef idx="0"/>
+    <cs:effectRef idx="0"/>
+    <cs:fontRef idx="minor">
+      <a:schemeClr val="tx1">
+        <a:lumMod val="65000"/>
+        <a:lumOff val="35000"/>
+      </a:schemeClr>
+    </cs:fontRef>
+    <cs:defRPr sz="900"/>
+  </cs:legend>
+  <cs:plotArea mods="allowNoFillOverride allowNoLineOverride">
+    <cs:lnRef idx="0"/>
+    <cs:fillRef idx="0"/>
+    <cs:effectRef idx="0"/>
+    <cs:fontRef idx="minor">
+      <a:schemeClr val="tx1"/>
+    </cs:fontRef>
+  </cs:plotArea>
+  <cs:plotArea3D mods="allowNoFillOverride allowNoLineOverride">
+    <cs:lnRef idx="0"/>
+    <cs:fillRef idx="0"/>
+    <cs:effectRef idx="0"/>
+    <cs:fontRef idx="minor">
+      <a:schemeClr val="tx1"/>
+    </cs:fontRef>
+  </cs:plotArea3D>
+  <cs:seriesAxis>
+    <cs:lnRef idx="0"/>
+    <cs:fillRef idx="0"/>
+    <cs:effectRef idx="0"/>
+    <cs:fontRef idx="minor">
+      <a:schemeClr val="tx1">
+        <a:lumMod val="65000"/>
+        <a:lumOff val="35000"/>
+      </a:schemeClr>
+    </cs:fontRef>
+    <cs:spPr>
+      <a:ln w="9525" cap="flat" cmpd="sng" algn="ctr">
+        <a:solidFill>
+          <a:schemeClr val="tx1">
+            <a:lumMod val="15000"/>
+            <a:lumOff val="85000"/>
+          </a:schemeClr>
+        </a:solidFill>
+        <a:round/>
+      </a:ln>
+    </cs:spPr>
+    <cs:defRPr sz="900"/>
+  </cs:seriesAxis>
+  <cs:seriesLine>
+    <cs:lnRef idx="0"/>
+    <cs:fillRef idx="0"/>
+    <cs:effectRef idx="0"/>
+    <cs:fontRef idx="minor">
+      <a:schemeClr val="tx1"/>
+    </cs:fontRef>
+    <cs:spPr>
+      <a:ln w="9525" cap="flat">
+        <a:solidFill>
+          <a:srgbClr val="D9D9D9"/>
+        </a:solidFill>
+        <a:round/>
+      </a:ln>
+    </cs:spPr>
+  </cs:seriesLine>
+  <cs:title>
+    <cs:lnRef idx="0"/>
+    <cs:fillRef idx="0"/>
+    <cs:effectRef idx="0"/>
+    <cs:fontRef idx="minor">
+      <a:schemeClr val="tx1">
+        <a:lumMod val="65000"/>
+        <a:lumOff val="35000"/>
+      </a:schemeClr>
+    </cs:fontRef>
+    <cs:defRPr sz="1400"/>
+  </cs:title>
+  <cs:trendline>
+    <cs:lnRef idx="0">
+      <cs:styleClr val="auto"/>
+    </cs:lnRef>
+    <cs:fillRef idx="0"/>
+    <cs:effectRef idx="0"/>
+    <cs:fontRef idx="minor">
+      <a:schemeClr val="tx1"/>
+    </cs:fontRef>
+    <cs:spPr>
+      <a:ln w="19050" cap="rnd">
+        <a:solidFill>
+          <a:schemeClr val="phClr"/>
+        </a:solidFill>
+        <a:prstDash val="sysDash"/>
+      </a:ln>
+    </cs:spPr>
+  </cs:trendline>
+  <cs:trendlineLabel>
+    <cs:lnRef idx="0"/>
+    <cs:fillRef idx="0"/>
+    <cs:effectRef idx="0"/>
+    <cs:fontRef idx="minor">
+      <a:schemeClr val="tx1">
+        <a:lumMod val="65000"/>
+        <a:lumOff val="35000"/>
+      </a:schemeClr>
+    </cs:fontRef>
+    <cs:defRPr sz="900"/>
+  </cs:trendlineLabel>
+  <cs:upBar>
+    <cs:lnRef idx="0"/>
+    <cs:fillRef idx="0"/>
+    <cs:effectRef idx="0"/>
+    <cs:fontRef idx="minor">
+      <a:schemeClr val="dk1"/>
+    </cs:fontRef>
+    <cs:spPr>
+      <a:solidFill>
+        <a:schemeClr val="lt1"/>
+      </a:solidFill>
+      <a:ln w="9525">
+        <a:solidFill>
+          <a:schemeClr val="tx1">
+            <a:lumMod val="15000"/>
+            <a:lumOff val="85000"/>
+          </a:schemeClr>
+        </a:solidFill>
+      </a:ln>
+    </cs:spPr>
+  </cs:upBar>
+  <cs:valueAxis>
+    <cs:lnRef idx="0"/>
+    <cs:fillRef idx="0"/>
+    <cs:effectRef idx="0"/>
+    <cs:fontRef idx="minor">
+      <a:schemeClr val="tx1">
+        <a:lumMod val="65000"/>
+        <a:lumOff val="35000"/>
+      </a:schemeClr>
+    </cs:fontRef>
+    <cs:defRPr sz="900"/>
+  </cs:valueAxis>
+  <cs:wall>
+    <cs:lnRef idx="0"/>
+    <cs:fillRef idx="0"/>
+    <cs:effectRef idx="0"/>
+    <cs:fontRef idx="minor">
+      <a:schemeClr val="tx1"/>
+    </cs:fontRef>
+  </cs:wall>
+</cs:chartStyle>
+</file>
+
+<file path=ppt/notesMasters/notesMaster1.xml><?xml version="1.0" encoding="utf-8"?>
+<p:notesMaster xmlns:a="http://schemas.openxmlformats.org/drawingml/2006/main" xmlns:r="http://schemas.openxmlformats.org/officeDocument/2006/relationships" xmlns:p="http://schemas.openxmlformats.org/presentationml/2006/main">
+  <p:cSld>
+    <p:bg>
+      <p:bgRef idx="1001">
+        <a:schemeClr val="bg1"/>
+      </p:bgRef>
+    </p:bg>
+    <p:spTree>
+      <p:nvGrpSpPr>
+        <p:cNvPr id="1" name=""/>
+        <p:cNvGrpSpPr/>
+        <p:nvPr/>
+      </p:nvGrpSpPr>
+      <p:grpSpPr>
+        <a:xfrm>
+          <a:off x="0" y="0"/>
+          <a:ext cx="0" cy="0"/>
+          <a:chOff x="0" y="0"/>
+          <a:chExt cx="0" cy="0"/>
+        </a:xfrm>
+      </p:grpSpPr>
+      <p:sp>
+        <p:nvSpPr>
+          <p:cNvPr id="2" name="Header Placeholder 1"/>
+          <p:cNvSpPr>
+            <a:spLocks noGrp="1"/>
+          </p:cNvSpPr>
+          <p:nvPr>
+            <p:ph type="hdr" sz="quarter"/>
+          </p:nvPr>
+        </p:nvSpPr>
+        <p:spPr>
+          <a:xfrm>
+            <a:off x="0" y="0"/>
+            <a:ext cx="2971800" cy="458788"/>
+          </a:xfrm>
+          <a:prstGeom prst="rect">
+            <a:avLst/>
+          </a:prstGeom>
+        </p:spPr>
+        <p:txBody>
+          <a:bodyPr vert="horz" lIns="91440" tIns="45720" rIns="91440" bIns="45720" rtlCol="0"/>
+          <a:lstStyle>
+            <a:lvl1pPr algn="l">
+              <a:defRPr sz="1200"/>
+            </a:lvl1pPr>
+          </a:lstStyle>
+          <a:p>
+            <a:endParaRPr lang="en-US"/>
+          </a:p>
+        </p:txBody>
+      </p:sp>
+      <p:sp>
+        <p:nvSpPr>
+          <p:cNvPr id="3" name="Date Placeholder 2"/>
+          <p:cNvSpPr>
+            <a:spLocks noGrp="1"/>
+          </p:cNvSpPr>
+          <p:nvPr>
+            <p:ph type="dt" idx="1"/>
+          </p:nvPr>
+        </p:nvSpPr>
+        <p:spPr>
+          <a:xfrm>
+            <a:off x="3884613" y="0"/>
+            <a:ext cx="2971800" cy="458788"/>
+          </a:xfrm>
+          <a:prstGeom prst="rect">
+            <a:avLst/>
+          </a:prstGeom>
+        </p:spPr>
+        <p:txBody>
+          <a:bodyPr vert="horz" lIns="91440" tIns="45720" rIns="91440" bIns="45720" rtlCol="0"/>
+          <a:lstStyle>
+            <a:lvl1pPr algn="r">
+              <a:defRPr sz="1200"/>
+            </a:lvl1pPr>
+          </a:lstStyle>
+          <a:p>
+            <a:fld id="{8034BD54-DC2E-4189-9394-57460C789C3E}" type="datetimeFigureOut">
+              <a:rPr lang="en-US" smtClean="0"/>
+              <a:t>1/20/2025</a:t>
+            </a:fld>
+            <a:endParaRPr lang="en-US"/>
+          </a:p>
+        </p:txBody>
+      </p:sp>
+      <p:sp>
+        <p:nvSpPr>
+          <p:cNvPr id="4" name="Slide Image Placeholder 3"/>
+          <p:cNvSpPr>
+            <a:spLocks noGrp="1" noRot="1" noChangeAspect="1"/>
+          </p:cNvSpPr>
+          <p:nvPr>
+            <p:ph type="sldImg" idx="2"/>
+          </p:nvPr>
+        </p:nvSpPr>
+        <p:spPr>
+          <a:xfrm>
+            <a:off x="685800" y="1143000"/>
+            <a:ext cx="5486400" cy="3086100"/>
+          </a:xfrm>
+          <a:prstGeom prst="rect">
+            <a:avLst/>
+          </a:prstGeom>
+          <a:noFill/>
+          <a:ln w="12700">
+            <a:solidFill>
+              <a:prstClr val="black"/>
+            </a:solidFill>
+          </a:ln>
+        </p:spPr>
+        <p:txBody>
+          <a:bodyPr vert="horz" lIns="91440" tIns="45720" rIns="91440" bIns="45720" rtlCol="0" anchor="ctr"/>
+          <a:lstStyle/>
+          <a:p>
+            <a:endParaRPr lang="en-US"/>
+          </a:p>
+        </p:txBody>
+      </p:sp>
+      <p:sp>
+        <p:nvSpPr>
+          <p:cNvPr id="5" name="Notes Placeholder 4"/>
+          <p:cNvSpPr>
+            <a:spLocks noGrp="1"/>
+          </p:cNvSpPr>
+          <p:nvPr>
+            <p:ph type="body" sz="quarter" idx="3"/>
+          </p:nvPr>
+        </p:nvSpPr>
+        <p:spPr>
+          <a:xfrm>
+            <a:off x="685800" y="4400550"/>
+            <a:ext cx="5486400" cy="3600450"/>
+          </a:xfrm>
+          <a:prstGeom prst="rect">
+            <a:avLst/>
+          </a:prstGeom>
+        </p:spPr>
+        <p:txBody>
+          <a:bodyPr vert="horz" lIns="91440" tIns="45720" rIns="91440" bIns="45720" rtlCol="0"/>
+          <a:lstStyle/>
+          <a:p>
+            <a:pPr lvl="0"/>
+            <a:r>
+              <a:rPr lang="en-US"/>
+              <a:t>Click to edit Master text styles</a:t>
+            </a:r>
+          </a:p>
+          <a:p>
+            <a:pPr lvl="1"/>
+            <a:r>
+              <a:rPr lang="en-US"/>
+              <a:t>Second level</a:t>
+            </a:r>
+          </a:p>
+          <a:p>
+            <a:pPr lvl="2"/>
+            <a:r>
+              <a:rPr lang="en-US"/>
+              <a:t>Third level</a:t>
+            </a:r>
+          </a:p>
+          <a:p>
+            <a:pPr lvl="3"/>
+            <a:r>
+              <a:rPr lang="en-US"/>
+              <a:t>Fourth level</a:t>
+            </a:r>
+          </a:p>
+          <a:p>
+            <a:pPr lvl="4"/>
+            <a:r>
+              <a:rPr lang="en-US"/>
+              <a:t>Fifth level</a:t>
+            </a:r>
+          </a:p>
+        </p:txBody>
+      </p:sp>
+      <p:sp>
+        <p:nvSpPr>
+          <p:cNvPr id="6" name="Footer Placeholder 5"/>
+          <p:cNvSpPr>
+            <a:spLocks noGrp="1"/>
+          </p:cNvSpPr>
+          <p:nvPr>
+            <p:ph type="ftr" sz="quarter" idx="4"/>
+          </p:nvPr>
+        </p:nvSpPr>
+        <p:spPr>
+          <a:xfrm>
+            <a:off x="0" y="8685213"/>
+            <a:ext cx="2971800" cy="458787"/>
+          </a:xfrm>
+          <a:prstGeom prst="rect">
+            <a:avLst/>
+          </a:prstGeom>
+        </p:spPr>
+        <p:txBody>
+          <a:bodyPr vert="horz" lIns="91440" tIns="45720" rIns="91440" bIns="45720" rtlCol="0" anchor="b"/>
+          <a:lstStyle>
+            <a:lvl1pPr algn="l">
+              <a:defRPr sz="1200"/>
+            </a:lvl1pPr>
+          </a:lstStyle>
+          <a:p>
+            <a:endParaRPr lang="en-US"/>
+          </a:p>
+        </p:txBody>
+      </p:sp>
+      <p:sp>
+        <p:nvSpPr>
+          <p:cNvPr id="7" name="Slide Number Placeholder 6"/>
+          <p:cNvSpPr>
+            <a:spLocks noGrp="1"/>
+          </p:cNvSpPr>
+          <p:nvPr>
+            <p:ph type="sldNum" sz="quarter" idx="5"/>
+          </p:nvPr>
+        </p:nvSpPr>
+        <p:spPr>
+          <a:xfrm>
+            <a:off x="3884613" y="8685213"/>
+            <a:ext cx="2971800" cy="458787"/>
+          </a:xfrm>
+          <a:prstGeom prst="rect">
+            <a:avLst/>
+          </a:prstGeom>
+        </p:spPr>
+        <p:txBody>
+          <a:bodyPr vert="horz" lIns="91440" tIns="45720" rIns="91440" bIns="45720" rtlCol="0" anchor="b"/>
+          <a:lstStyle>
+            <a:lvl1pPr algn="r">
+              <a:defRPr sz="1200"/>
+            </a:lvl1pPr>
+          </a:lstStyle>
+          <a:p>
+            <a:fld id="{8195DB9C-72FD-4754-9AF2-6BE558114B69}" type="slidenum">
+              <a:rPr lang="en-US" smtClean="0"/>
+              <a:t>‹#›</a:t>
+            </a:fld>
+            <a:endParaRPr lang="en-US"/>
+          </a:p>
+        </p:txBody>
+      </p:sp>
+    </p:spTree>
+    <p:extLst>
+      <p:ext uri="{BB962C8B-B14F-4D97-AF65-F5344CB8AC3E}">
+        <p14:creationId xmlns:p14="http://schemas.microsoft.com/office/powerpoint/2010/main" val="3527616537"/>
+      </p:ext>
+    </p:extLst>
+  </p:cSld>
+  <p:clrMap bg1="lt1" tx1="dk1" bg2="lt2" tx2="dk2" accent1="accent1" accent2="accent2" accent3="accent3" accent4="accent4" accent5="accent5" accent6="accent6" hlink="hlink" folHlink="folHlink"/>
+  <p:notesStyle>
+    <a:lvl1pPr marL="0" algn="l" defTabSz="914400" rtl="0" eaLnBrk="1" latinLnBrk="0" hangingPunct="1">
+      <a:defRPr sz="1200" kern="1200">
+        <a:solidFill>
+          <a:schemeClr val="tx1"/>
+        </a:solidFill>
+        <a:latin typeface="+mn-lt"/>
+        <a:ea typeface="+mn-ea"/>
+        <a:cs typeface="+mn-cs"/>
+      </a:defRPr>
+    </a:lvl1pPr>
+    <a:lvl2pPr marL="457200" algn="l" defTabSz="914400" rtl="0" eaLnBrk="1" latinLnBrk="0" hangingPunct="1">
+      <a:defRPr sz="1200" kern="1200">
+        <a:solidFill>
+          <a:schemeClr val="tx1"/>
+        </a:solidFill>
+        <a:latin typeface="+mn-lt"/>
+        <a:ea typeface="+mn-ea"/>
+        <a:cs typeface="+mn-cs"/>
+      </a:defRPr>
+    </a:lvl2pPr>
+    <a:lvl3pPr marL="914400" algn="l" defTabSz="914400" rtl="0" eaLnBrk="1" latinLnBrk="0" hangingPunct="1">
+      <a:defRPr sz="1200" kern="1200">
+        <a:solidFill>
+          <a:schemeClr val="tx1"/>
+        </a:solidFill>
+        <a:latin typeface="+mn-lt"/>
+        <a:ea typeface="+mn-ea"/>
+        <a:cs typeface="+mn-cs"/>
+      </a:defRPr>
+    </a:lvl3pPr>
+    <a:lvl4pPr marL="1371600" algn="l" defTabSz="914400" rtl="0" eaLnBrk="1" latinLnBrk="0" hangingPunct="1">
+      <a:defRPr sz="1200" kern="1200">
+        <a:solidFill>
+          <a:schemeClr val="tx1"/>
+        </a:solidFill>
+        <a:latin typeface="+mn-lt"/>
+        <a:ea typeface="+mn-ea"/>
+        <a:cs typeface="+mn-cs"/>
+      </a:defRPr>
+    </a:lvl4pPr>
+    <a:lvl5pPr marL="1828800" algn="l" defTabSz="914400" rtl="0" eaLnBrk="1" latinLnBrk="0" hangingPunct="1">
+      <a:defRPr sz="1200" kern="1200">
+        <a:solidFill>
+          <a:schemeClr val="tx1"/>
+        </a:solidFill>
+        <a:latin typeface="+mn-lt"/>
+        <a:ea typeface="+mn-ea"/>
+        <a:cs typeface="+mn-cs"/>
+      </a:defRPr>
+    </a:lvl5pPr>
+    <a:lvl6pPr marL="2286000" algn="l" defTabSz="914400" rtl="0" eaLnBrk="1" latinLnBrk="0" hangingPunct="1">
+      <a:defRPr sz="1200" kern="1200">
+        <a:solidFill>
+          <a:schemeClr val="tx1"/>
+        </a:solidFill>
+        <a:latin typeface="+mn-lt"/>
+        <a:ea typeface="+mn-ea"/>
+        <a:cs typeface="+mn-cs"/>
+      </a:defRPr>
+    </a:lvl6pPr>
+    <a:lvl7pPr marL="2743200" algn="l" defTabSz="914400" rtl="0" eaLnBrk="1" latinLnBrk="0" hangingPunct="1">
+      <a:defRPr sz="1200" kern="1200">
+        <a:solidFill>
+          <a:schemeClr val="tx1"/>
+        </a:solidFill>
+        <a:latin typeface="+mn-lt"/>
+        <a:ea typeface="+mn-ea"/>
+        <a:cs typeface="+mn-cs"/>
+      </a:defRPr>
+    </a:lvl7pPr>
+    <a:lvl8pPr marL="3200400" algn="l" defTabSz="914400" rtl="0" eaLnBrk="1" latinLnBrk="0" hangingPunct="1">
+      <a:defRPr sz="1200" kern="1200">
+        <a:solidFill>
+          <a:schemeClr val="tx1"/>
+        </a:solidFill>
+        <a:latin typeface="+mn-lt"/>
+        <a:ea typeface="+mn-ea"/>
+        <a:cs typeface="+mn-cs"/>
+      </a:defRPr>
+    </a:lvl8pPr>
+    <a:lvl9pPr marL="3657600" algn="l" defTabSz="914400" rtl="0" eaLnBrk="1" latinLnBrk="0" hangingPunct="1">
+      <a:defRPr sz="1200" kern="1200">
+        <a:solidFill>
+          <a:schemeClr val="tx1"/>
+        </a:solidFill>
+        <a:latin typeface="+mn-lt"/>
+        <a:ea typeface="+mn-ea"/>
+        <a:cs typeface="+mn-cs"/>
+      </a:defRPr>
+    </a:lvl9pPr>
+  </p:notesStyle>
+</p:notesMaster>
+</file>
+
+<file path=ppt/notesSlides/notesSlide1.xml><?xml version="1.0" encoding="utf-8"?>
+<p:notes xmlns:a="http://schemas.openxmlformats.org/drawingml/2006/main" xmlns:r="http://schemas.openxmlformats.org/officeDocument/2006/relationships" xmlns:p="http://schemas.openxmlformats.org/presentationml/2006/main">
+  <p:cSld>
+    <p:spTree>
+      <p:nvGrpSpPr>
+        <p:cNvPr id="1" name=""/>
+        <p:cNvGrpSpPr/>
+        <p:nvPr/>
+      </p:nvGrpSpPr>
+      <p:grpSpPr>
+        <a:xfrm>
+          <a:off x="0" y="0"/>
+          <a:ext cx="0" cy="0"/>
+          <a:chOff x="0" y="0"/>
+          <a:chExt cx="0" cy="0"/>
+        </a:xfrm>
+      </p:grpSpPr>
+      <p:sp>
+        <p:nvSpPr>
+          <p:cNvPr id="2" name="Slide Image Placeholder 1"/>
+          <p:cNvSpPr>
+            <a:spLocks noGrp="1" noRot="1" noChangeAspect="1"/>
+          </p:cNvSpPr>
+          <p:nvPr>
+            <p:ph type="sldImg"/>
+          </p:nvPr>
+        </p:nvSpPr>
+        <p:spPr/>
+      </p:sp>
+      <p:sp>
+        <p:nvSpPr>
+          <p:cNvPr id="3" name="Notes Placeholder 2"/>
+          <p:cNvSpPr>
+            <a:spLocks noGrp="1"/>
+          </p:cNvSpPr>
+          <p:nvPr>
+            <p:ph type="body" idx="1"/>
+          </p:nvPr>
+        </p:nvSpPr>
+        <p:spPr/>
+        <p:txBody>
+          <a:bodyPr/>
+          <a:lstStyle/>
+          <a:p>
+            <a:endParaRPr lang="en-US" dirty="0"/>
+          </a:p>
+        </p:txBody>
+      </p:sp>
+      <p:sp>
+        <p:nvSpPr>
+          <p:cNvPr id="4" name="Slide Number Placeholder 3"/>
+          <p:cNvSpPr>
+            <a:spLocks noGrp="1"/>
+          </p:cNvSpPr>
+          <p:nvPr>
+            <p:ph type="sldNum" sz="quarter" idx="5"/>
+          </p:nvPr>
+        </p:nvSpPr>
+        <p:spPr/>
+        <p:txBody>
+          <a:bodyPr/>
+          <a:lstStyle/>
+          <a:p>
+            <a:fld id="{8195DB9C-72FD-4754-9AF2-6BE558114B69}" type="slidenum">
+              <a:rPr lang="en-US" smtClean="0"/>
+              <a:t>5</a:t>
+            </a:fld>
+            <a:endParaRPr lang="en-US"/>
+          </a:p>
+        </p:txBody>
+      </p:sp>
+    </p:spTree>
+    <p:extLst>
+      <p:ext uri="{BB962C8B-B14F-4D97-AF65-F5344CB8AC3E}">
+        <p14:creationId xmlns:p14="http://schemas.microsoft.com/office/powerpoint/2010/main" val="729766887"/>
+      </p:ext>
+    </p:extLst>
+  </p:cSld>
+  <p:clrMapOvr>
+    <a:masterClrMapping/>
+  </p:clrMapOvr>
+</p:notes>
+</file>
+
+<file path=ppt/notesSlides/notesSlide2.xml><?xml version="1.0" encoding="utf-8"?>
+<p:notes xmlns:a="http://schemas.openxmlformats.org/drawingml/2006/main" xmlns:r="http://schemas.openxmlformats.org/officeDocument/2006/relationships" xmlns:p="http://schemas.openxmlformats.org/presentationml/2006/main">
+  <p:cSld>
+    <p:spTree>
+      <p:nvGrpSpPr>
+        <p:cNvPr id="1" name=""/>
+        <p:cNvGrpSpPr/>
+        <p:nvPr/>
+      </p:nvGrpSpPr>
+      <p:grpSpPr>
+        <a:xfrm>
+          <a:off x="0" y="0"/>
+          <a:ext cx="0" cy="0"/>
+          <a:chOff x="0" y="0"/>
+          <a:chExt cx="0" cy="0"/>
+        </a:xfrm>
+      </p:grpSpPr>
+      <p:sp>
+        <p:nvSpPr>
+          <p:cNvPr id="2" name="Slide Image Placeholder 1"/>
+          <p:cNvSpPr>
+            <a:spLocks noGrp="1" noRot="1" noChangeAspect="1"/>
+          </p:cNvSpPr>
+          <p:nvPr>
+            <p:ph type="sldImg"/>
+          </p:nvPr>
+        </p:nvSpPr>
+        <p:spPr/>
+      </p:sp>
+      <p:sp>
+        <p:nvSpPr>
+          <p:cNvPr id="3" name="Notes Placeholder 2"/>
+          <p:cNvSpPr>
+            <a:spLocks noGrp="1"/>
+          </p:cNvSpPr>
+          <p:nvPr>
+            <p:ph type="body" idx="1"/>
+          </p:nvPr>
+        </p:nvSpPr>
+        <p:spPr/>
+        <p:txBody>
+          <a:bodyPr/>
+          <a:lstStyle/>
+          <a:p>
+            <a:endParaRPr lang="en-US" dirty="0"/>
+          </a:p>
+        </p:txBody>
+      </p:sp>
+      <p:sp>
+        <p:nvSpPr>
+          <p:cNvPr id="4" name="Slide Number Placeholder 3"/>
+          <p:cNvSpPr>
+            <a:spLocks noGrp="1"/>
+          </p:cNvSpPr>
+          <p:nvPr>
+            <p:ph type="sldNum" sz="quarter" idx="5"/>
+          </p:nvPr>
+        </p:nvSpPr>
+        <p:spPr/>
+        <p:txBody>
+          <a:bodyPr/>
+          <a:lstStyle/>
+          <a:p>
+            <a:fld id="{8195DB9C-72FD-4754-9AF2-6BE558114B69}" type="slidenum">
+              <a:rPr lang="en-US" smtClean="0"/>
+              <a:t>6</a:t>
+            </a:fld>
+            <a:endParaRPr lang="en-US"/>
+          </a:p>
+        </p:txBody>
+      </p:sp>
+    </p:spTree>
+    <p:extLst>
+      <p:ext uri="{BB962C8B-B14F-4D97-AF65-F5344CB8AC3E}">
+        <p14:creationId xmlns:p14="http://schemas.microsoft.com/office/powerpoint/2010/main" val="1008737799"/>
+      </p:ext>
+    </p:extLst>
+  </p:cSld>
+  <p:clrMapOvr>
+    <a:masterClrMapping/>
+  </p:clrMapOvr>
+</p:notes>
 </file>
 
 <file path=ppt/slideLayouts/slideLayout1.xml><?xml version="1.0" encoding="utf-8"?>
@@ -256,7 +2471,7 @@
           <a:p>
             <a:fld id="{9A888D83-9ED2-4D05-8386-9F6C8747FF77}" type="datetimeFigureOut">
               <a:rPr lang="en-US" smtClean="0"/>
-              <a:t>1/19/2025</a:t>
+              <a:t>1/20/2025</a:t>
             </a:fld>
             <a:endParaRPr lang="en-US"/>
           </a:p>
@@ -454,7 +2669,7 @@
           <a:p>
             <a:fld id="{9A888D83-9ED2-4D05-8386-9F6C8747FF77}" type="datetimeFigureOut">
               <a:rPr lang="en-US" smtClean="0"/>
-              <a:t>1/19/2025</a:t>
+              <a:t>1/20/2025</a:t>
             </a:fld>
             <a:endParaRPr lang="en-US"/>
           </a:p>
@@ -662,7 +2877,7 @@
           <a:p>
             <a:fld id="{9A888D83-9ED2-4D05-8386-9F6C8747FF77}" type="datetimeFigureOut">
               <a:rPr lang="en-US" smtClean="0"/>
-              <a:t>1/19/2025</a:t>
+              <a:t>1/20/2025</a:t>
             </a:fld>
             <a:endParaRPr lang="en-US"/>
           </a:p>
@@ -860,7 +3075,7 @@
           <a:p>
             <a:fld id="{9A888D83-9ED2-4D05-8386-9F6C8747FF77}" type="datetimeFigureOut">
               <a:rPr lang="en-US" smtClean="0"/>
-              <a:t>1/19/2025</a:t>
+              <a:t>1/20/2025</a:t>
             </a:fld>
             <a:endParaRPr lang="en-US"/>
           </a:p>
@@ -1135,7 +3350,7 @@
           <a:p>
             <a:fld id="{9A888D83-9ED2-4D05-8386-9F6C8747FF77}" type="datetimeFigureOut">
               <a:rPr lang="en-US" smtClean="0"/>
-              <a:t>1/19/2025</a:t>
+              <a:t>1/20/2025</a:t>
             </a:fld>
             <a:endParaRPr lang="en-US"/>
           </a:p>
@@ -1400,7 +3615,7 @@
           <a:p>
             <a:fld id="{9A888D83-9ED2-4D05-8386-9F6C8747FF77}" type="datetimeFigureOut">
               <a:rPr lang="en-US" smtClean="0"/>
-              <a:t>1/19/2025</a:t>
+              <a:t>1/20/2025</a:t>
             </a:fld>
             <a:endParaRPr lang="en-US"/>
           </a:p>
@@ -1812,7 +4027,7 @@
           <a:p>
             <a:fld id="{9A888D83-9ED2-4D05-8386-9F6C8747FF77}" type="datetimeFigureOut">
               <a:rPr lang="en-US" smtClean="0"/>
-              <a:t>1/19/2025</a:t>
+              <a:t>1/20/2025</a:t>
             </a:fld>
             <a:endParaRPr lang="en-US"/>
           </a:p>
@@ -1953,7 +4168,7 @@
           <a:p>
             <a:fld id="{9A888D83-9ED2-4D05-8386-9F6C8747FF77}" type="datetimeFigureOut">
               <a:rPr lang="en-US" smtClean="0"/>
-              <a:t>1/19/2025</a:t>
+              <a:t>1/20/2025</a:t>
             </a:fld>
             <a:endParaRPr lang="en-US"/>
           </a:p>
@@ -2066,7 +4281,7 @@
           <a:p>
             <a:fld id="{9A888D83-9ED2-4D05-8386-9F6C8747FF77}" type="datetimeFigureOut">
               <a:rPr lang="en-US" smtClean="0"/>
-              <a:t>1/19/2025</a:t>
+              <a:t>1/20/2025</a:t>
             </a:fld>
             <a:endParaRPr lang="en-US"/>
           </a:p>
@@ -2377,7 +4592,7 @@
           <a:p>
             <a:fld id="{9A888D83-9ED2-4D05-8386-9F6C8747FF77}" type="datetimeFigureOut">
               <a:rPr lang="en-US" smtClean="0"/>
-              <a:t>1/19/2025</a:t>
+              <a:t>1/20/2025</a:t>
             </a:fld>
             <a:endParaRPr lang="en-US"/>
           </a:p>
@@ -2665,7 +4880,7 @@
           <a:p>
             <a:fld id="{9A888D83-9ED2-4D05-8386-9F6C8747FF77}" type="datetimeFigureOut">
               <a:rPr lang="en-US" smtClean="0"/>
-              <a:t>1/19/2025</a:t>
+              <a:t>1/20/2025</a:t>
             </a:fld>
             <a:endParaRPr lang="en-US"/>
           </a:p>
@@ -2906,7 +5121,7 @@
           <a:p>
             <a:fld id="{9A888D83-9ED2-4D05-8386-9F6C8747FF77}" type="datetimeFigureOut">
               <a:rPr lang="en-US" smtClean="0"/>
-              <a:t>1/19/2025</a:t>
+              <a:t>1/20/2025</a:t>
             </a:fld>
             <a:endParaRPr lang="en-US"/>
           </a:p>
@@ -3538,8 +5753,8 @@
         </p:nvSpPr>
         <p:spPr>
           <a:xfrm>
-            <a:off x="1285241" y="1008993"/>
-            <a:ext cx="9231410" cy="3542045"/>
+            <a:off x="641774" y="1057113"/>
+            <a:ext cx="10905053" cy="1651911"/>
           </a:xfrm>
         </p:spPr>
         <p:txBody>
@@ -3548,21 +5763,18 @@
           </a:bodyPr>
           <a:lstStyle/>
           <a:p>
-            <a:pPr algn="l"/>
-            <a:r>
-              <a:rPr lang="en-US" sz="8100" b="1" i="0">
+            <a:r>
+              <a:rPr lang="en-US" sz="5400" b="1" i="0" dirty="0">
                 <a:effectLst/>
-                <a:latin typeface="-apple-system"/>
               </a:rPr>
-              <a:t>Southbridge-Public-Schools-Tasks</a:t>
+              <a:t>Southbridge Public Schools Data Tasks</a:t>
             </a:r>
             <a:br>
-              <a:rPr lang="en-US" sz="8100" b="1" i="0">
+              <a:rPr lang="en-US" sz="5400" b="1" i="0" dirty="0">
                 <a:effectLst/>
-                <a:latin typeface="-apple-system"/>
               </a:rPr>
             </a:br>
-            <a:endParaRPr lang="en-US" sz="8100"/>
+            <a:endParaRPr lang="en-US" sz="5400" dirty="0"/>
           </a:p>
         </p:txBody>
       </p:sp>
@@ -3596,21 +5808,21 @@
           <a:p>
             <a:pPr algn="l"/>
             <a:r>
-              <a:rPr lang="en-US" sz="2200"/>
+              <a:rPr lang="en-US" sz="2200" dirty="0"/>
               <a:t>Sirjana Bhatta</a:t>
             </a:r>
           </a:p>
           <a:p>
             <a:pPr algn="l"/>
             <a:r>
-              <a:rPr lang="en-US" sz="2200"/>
+              <a:rPr lang="en-US" sz="2200" dirty="0"/>
               <a:t>Framingham State University </a:t>
             </a:r>
           </a:p>
           <a:p>
             <a:pPr algn="l"/>
             <a:r>
-              <a:rPr lang="en-US" sz="2200"/>
+              <a:rPr lang="en-US" sz="2200" dirty="0"/>
               <a:t>December 2024</a:t>
             </a:r>
           </a:p>
@@ -3897,6 +6109,135 @@
 </file>
 
 <file path=ppt/slides/slide2.xml><?xml version="1.0" encoding="utf-8"?>
+<p:sld xmlns:a="http://schemas.openxmlformats.org/drawingml/2006/main" xmlns:r="http://schemas.openxmlformats.org/officeDocument/2006/relationships" xmlns:p="http://schemas.openxmlformats.org/presentationml/2006/main">
+  <p:cSld>
+    <p:spTree>
+      <p:nvGrpSpPr>
+        <p:cNvPr id="1" name=""/>
+        <p:cNvGrpSpPr/>
+        <p:nvPr/>
+      </p:nvGrpSpPr>
+      <p:grpSpPr>
+        <a:xfrm>
+          <a:off x="0" y="0"/>
+          <a:ext cx="0" cy="0"/>
+          <a:chOff x="0" y="0"/>
+          <a:chExt cx="0" cy="0"/>
+        </a:xfrm>
+      </p:grpSpPr>
+      <p:sp>
+        <p:nvSpPr>
+          <p:cNvPr id="2" name="Title 1">
+            <a:extLst>
+              <a:ext uri="{FF2B5EF4-FFF2-40B4-BE49-F238E27FC236}">
+                <a16:creationId xmlns:a16="http://schemas.microsoft.com/office/drawing/2014/main" id="{F864C493-2B1B-6081-6465-430457D1B8C0}"/>
+              </a:ext>
+            </a:extLst>
+          </p:cNvPr>
+          <p:cNvSpPr>
+            <a:spLocks noGrp="1"/>
+          </p:cNvSpPr>
+          <p:nvPr>
+            <p:ph type="ctrTitle"/>
+          </p:nvPr>
+        </p:nvSpPr>
+        <p:spPr>
+          <a:xfrm>
+            <a:off x="914399" y="254522"/>
+            <a:ext cx="10105534" cy="4477733"/>
+          </a:xfrm>
+        </p:spPr>
+        <p:txBody>
+          <a:bodyPr>
+            <a:normAutofit fontScale="90000"/>
+          </a:bodyPr>
+          <a:lstStyle/>
+          <a:p>
+            <a:r>
+              <a:rPr lang="en-US" sz="4400" b="1" dirty="0"/>
+              <a:t>         1. Data Visualization and Observation Task</a:t>
+            </a:r>
+            <a:br>
+              <a:rPr lang="en-US" sz="4400" dirty="0"/>
+            </a:br>
+            <a:r>
+              <a:rPr lang="en-US" sz="4400" dirty="0"/>
+              <a:t>	</a:t>
+            </a:r>
+            <a:r>
+              <a:rPr lang="en-US" sz="3200" dirty="0">
+                <a:latin typeface="+mn-lt"/>
+              </a:rPr>
+              <a:t>- Composite Score at the Beginning of 2021</a:t>
+            </a:r>
+            <a:br>
+              <a:rPr lang="en-US" sz="3200" dirty="0">
+                <a:latin typeface="+mn-lt"/>
+              </a:rPr>
+            </a:br>
+            <a:r>
+              <a:rPr lang="en-US" sz="3200" dirty="0">
+                <a:latin typeface="+mn-lt"/>
+              </a:rPr>
+              <a:t>- Composite Score at the End of 2021</a:t>
+            </a:r>
+            <a:br>
+              <a:rPr lang="en-US" sz="3200" dirty="0">
+                <a:latin typeface="+mn-lt"/>
+              </a:rPr>
+            </a:br>
+            <a:r>
+              <a:rPr lang="en-US" sz="3200" dirty="0">
+                <a:latin typeface="+mn-lt"/>
+              </a:rPr>
+              <a:t>           - Composite Score at the Beginning of 2022</a:t>
+            </a:r>
+            <a:br>
+              <a:rPr lang="en-US" sz="3200" dirty="0">
+                <a:latin typeface="+mn-lt"/>
+              </a:rPr>
+            </a:br>
+            <a:r>
+              <a:rPr lang="en-US" sz="3200" dirty="0">
+                <a:latin typeface="+mn-lt"/>
+              </a:rPr>
+              <a:t>- Composite Score at the End of 2022</a:t>
+            </a:r>
+            <a:br>
+              <a:rPr lang="en-US" b="1" dirty="0"/>
+            </a:br>
+            <a:r>
+              <a:rPr lang="en-US" b="1" dirty="0"/>
+              <a:t> 2. </a:t>
+            </a:r>
+            <a:r>
+              <a:rPr lang="en-US" sz="5400" b="1" dirty="0"/>
+              <a:t>Error Troubleshooting Task</a:t>
+            </a:r>
+            <a:br>
+              <a:rPr lang="en-US" sz="5400" b="1" dirty="0"/>
+            </a:br>
+            <a:r>
+              <a:rPr lang="en-US" sz="5400" b="1" dirty="0"/>
+              <a:t>             </a:t>
+            </a:r>
+          </a:p>
+        </p:txBody>
+      </p:sp>
+    </p:spTree>
+    <p:extLst>
+      <p:ext uri="{BB962C8B-B14F-4D97-AF65-F5344CB8AC3E}">
+        <p14:creationId xmlns:p14="http://schemas.microsoft.com/office/powerpoint/2010/main" val="102576239"/>
+      </p:ext>
+    </p:extLst>
+  </p:cSld>
+  <p:clrMapOvr>
+    <a:masterClrMapping/>
+  </p:clrMapOvr>
+</p:sld>
+</file>
+
+<file path=ppt/slides/slide3.xml><?xml version="1.0" encoding="utf-8"?>
 <p:sld xmlns:a="http://schemas.openxmlformats.org/drawingml/2006/main" xmlns:r="http://schemas.openxmlformats.org/officeDocument/2006/relationships" xmlns:p="http://schemas.openxmlformats.org/presentationml/2006/main">
   <p:cSld>
     <p:bg>
@@ -5019,8 +7360,8 @@
         </p:nvSpPr>
         <p:spPr>
           <a:xfrm>
-            <a:off x="838201" y="1348317"/>
-            <a:ext cx="5962785" cy="4562573"/>
+            <a:off x="838201" y="1348318"/>
+            <a:ext cx="5962785" cy="4430314"/>
           </a:xfrm>
         </p:spPr>
         <p:txBody>
@@ -5065,7 +7406,7 @@
           <a:p>
             <a:r>
               <a:rPr lang="en-US" sz="2000" dirty="0"/>
-              <a:t>23 students in with composite score range [293-317] yellow needs Strategic Support.</a:t>
+              <a:t>23 students in yellow with composite score range [293-317]  needs Strategic Support.</a:t>
             </a:r>
           </a:p>
           <a:p>
@@ -5077,7 +7418,7 @@
           <a:p>
             <a:r>
               <a:rPr lang="en-US" sz="2000" dirty="0"/>
-              <a:t>45 students in bule with score range [341, 365] , [365, 389] and [389, 423] needs Core plus support.</a:t>
+              <a:t>45 students in bule with score range [341, 365] , [365, 389], and [389, 423] needs Core plus support.</a:t>
             </a:r>
           </a:p>
           <a:p>
@@ -5134,7 +7475,7 @@
 </p:sld>
 </file>
 
-<file path=ppt/slides/slide3.xml><?xml version="1.0" encoding="utf-8"?>
+<file path=ppt/slides/slide4.xml><?xml version="1.0" encoding="utf-8"?>
 <p:sld xmlns:a="http://schemas.openxmlformats.org/drawingml/2006/main" xmlns:r="http://schemas.openxmlformats.org/officeDocument/2006/relationships" xmlns:p="http://schemas.openxmlformats.org/presentationml/2006/main">
   <p:cSld>
     <p:spTree>
@@ -5205,8 +7546,8 @@
         </p:nvSpPr>
         <p:spPr>
           <a:xfrm>
-            <a:off x="838201" y="1348317"/>
-            <a:ext cx="5962785" cy="4562573"/>
+            <a:off x="838201" y="1248020"/>
+            <a:ext cx="5962785" cy="4763165"/>
           </a:xfrm>
         </p:spPr>
         <p:txBody>
@@ -5299,7 +7640,7 @@
         </p:blipFill>
         <p:spPr>
           <a:xfrm>
-            <a:off x="6800986" y="1086735"/>
+            <a:off x="6800986" y="1248020"/>
             <a:ext cx="5201376" cy="4763165"/>
           </a:xfrm>
           <a:prstGeom prst="rect">
@@ -5311,6 +7652,1135 @@
     <p:extLst>
       <p:ext uri="{BB962C8B-B14F-4D97-AF65-F5344CB8AC3E}">
         <p14:creationId xmlns:p14="http://schemas.microsoft.com/office/powerpoint/2010/main" val="1347290859"/>
+      </p:ext>
+    </p:extLst>
+  </p:cSld>
+  <p:clrMapOvr>
+    <a:masterClrMapping/>
+  </p:clrMapOvr>
+</p:sld>
+</file>
+
+<file path=ppt/slides/slide5.xml><?xml version="1.0" encoding="utf-8"?>
+<p:sld xmlns:a="http://schemas.openxmlformats.org/drawingml/2006/main" xmlns:r="http://schemas.openxmlformats.org/officeDocument/2006/relationships" xmlns:p="http://schemas.openxmlformats.org/presentationml/2006/main">
+  <p:cSld>
+    <p:spTree>
+      <p:nvGrpSpPr>
+        <p:cNvPr id="1" name=""/>
+        <p:cNvGrpSpPr/>
+        <p:nvPr/>
+      </p:nvGrpSpPr>
+      <p:grpSpPr>
+        <a:xfrm>
+          <a:off x="0" y="0"/>
+          <a:ext cx="0" cy="0"/>
+          <a:chOff x="0" y="0"/>
+          <a:chExt cx="0" cy="0"/>
+        </a:xfrm>
+      </p:grpSpPr>
+      <p:sp>
+        <p:nvSpPr>
+          <p:cNvPr id="2" name="Title 1">
+            <a:extLst>
+              <a:ext uri="{FF2B5EF4-FFF2-40B4-BE49-F238E27FC236}">
+                <a16:creationId xmlns:a16="http://schemas.microsoft.com/office/drawing/2014/main" id="{C46A0DBE-3A6B-1B23-C8D2-4EDCFE56F760}"/>
+              </a:ext>
+            </a:extLst>
+          </p:cNvPr>
+          <p:cNvSpPr>
+            <a:spLocks noGrp="1"/>
+          </p:cNvSpPr>
+          <p:nvPr>
+            <p:ph type="title"/>
+          </p:nvPr>
+        </p:nvSpPr>
+        <p:spPr/>
+        <p:txBody>
+          <a:bodyPr>
+            <a:normAutofit/>
+          </a:bodyPr>
+          <a:lstStyle/>
+          <a:p>
+            <a:r>
+              <a:rPr lang="en-US" sz="3700" dirty="0"/>
+              <a:t>Task 2 : Composite Score at the Beginning of 2022</a:t>
+            </a:r>
+          </a:p>
+        </p:txBody>
+      </p:sp>
+      <p:sp>
+        <p:nvSpPr>
+          <p:cNvPr id="3" name="Content Placeholder 2">
+            <a:extLst>
+              <a:ext uri="{FF2B5EF4-FFF2-40B4-BE49-F238E27FC236}">
+                <a16:creationId xmlns:a16="http://schemas.microsoft.com/office/drawing/2014/main" id="{BD48A00F-97C5-3C05-F5B0-05A4A0AC6B75}"/>
+              </a:ext>
+            </a:extLst>
+          </p:cNvPr>
+          <p:cNvSpPr>
+            <a:spLocks noGrp="1"/>
+          </p:cNvSpPr>
+          <p:nvPr>
+            <p:ph sz="half" idx="1"/>
+          </p:nvPr>
+        </p:nvSpPr>
+        <p:spPr>
+          <a:xfrm>
+            <a:off x="838200" y="1904213"/>
+            <a:ext cx="5181600" cy="4272750"/>
+          </a:xfrm>
+        </p:spPr>
+        <p:txBody>
+          <a:bodyPr>
+            <a:normAutofit lnSpcReduction="10000"/>
+          </a:bodyPr>
+          <a:lstStyle/>
+          <a:p>
+            <a:r>
+              <a:rPr lang="en-US" sz="2200" dirty="0"/>
+              <a:t>20</a:t>
+            </a:r>
+            <a:r>
+              <a:rPr lang="en-US" sz="2200" baseline="30000" dirty="0"/>
+              <a:t>th</a:t>
+            </a:r>
+            <a:r>
+              <a:rPr lang="en-US" sz="2200" dirty="0"/>
+              <a:t> Percentile : 291.8</a:t>
+            </a:r>
+          </a:p>
+          <a:p>
+            <a:r>
+              <a:rPr lang="en-US" sz="2200" dirty="0"/>
+              <a:t>40</a:t>
+            </a:r>
+            <a:r>
+              <a:rPr lang="en-US" sz="2200" baseline="30000" dirty="0"/>
+              <a:t>th</a:t>
+            </a:r>
+            <a:r>
+              <a:rPr lang="en-US" sz="2200" dirty="0"/>
+              <a:t> Percentile: 309.2</a:t>
+            </a:r>
+          </a:p>
+          <a:p>
+            <a:r>
+              <a:rPr lang="en-US" sz="2200" dirty="0"/>
+              <a:t>30 students in red with composite score range [268-292] needs intensive Support.</a:t>
+            </a:r>
+          </a:p>
+          <a:p>
+            <a:r>
+              <a:rPr lang="en-US" sz="2200" dirty="0"/>
+              <a:t>35 students in yellow with composite score range [292-316] needs Strategic Support.</a:t>
+            </a:r>
+          </a:p>
+          <a:p>
+            <a:r>
+              <a:rPr lang="en-US" sz="2200" dirty="0"/>
+              <a:t>There are no students needs core support.</a:t>
+            </a:r>
+          </a:p>
+          <a:p>
+            <a:r>
+              <a:rPr lang="en-US" sz="2200" dirty="0"/>
+              <a:t>75 students in bule with score range [316,340] , [340, 364] and [364, 388], [388,412], [412,436], [436,460] needs Core plus support.</a:t>
+            </a:r>
+          </a:p>
+          <a:p>
+            <a:endParaRPr lang="en-US" sz="2800" dirty="0"/>
+          </a:p>
+          <a:p>
+            <a:endParaRPr lang="en-US" sz="2800" dirty="0"/>
+          </a:p>
+          <a:p>
+            <a:endParaRPr lang="en-US" dirty="0"/>
+          </a:p>
+        </p:txBody>
+      </p:sp>
+      <mc:AlternateContent xmlns:mc="http://schemas.openxmlformats.org/markup-compatibility/2006" xmlns:cx1="http://schemas.microsoft.com/office/drawing/2015/9/8/chartex">
+        <mc:Choice Requires="cx1">
+          <p:graphicFrame>
+            <p:nvGraphicFramePr>
+              <p:cNvPr id="5" name="Content Placeholder 4">
+                <a:extLst>
+                  <a:ext uri="{FF2B5EF4-FFF2-40B4-BE49-F238E27FC236}">
+                    <a16:creationId xmlns:a16="http://schemas.microsoft.com/office/drawing/2014/main" id="{1745AF23-6658-194E-7C5D-204466C0B132}"/>
+                  </a:ext>
+                </a:extLst>
+              </p:cNvPr>
+              <p:cNvGraphicFramePr>
+                <a:graphicFrameLocks noGrp="1"/>
+              </p:cNvGraphicFramePr>
+              <p:nvPr>
+                <p:ph sz="half" idx="2"/>
+                <p:extLst>
+                  <p:ext uri="{D42A27DB-BD31-4B8C-83A1-F6EECF244321}">
+                    <p14:modId xmlns:p14="http://schemas.microsoft.com/office/powerpoint/2010/main" val="130992505"/>
+                  </p:ext>
+                </p:extLst>
+              </p:nvPr>
+            </p:nvGraphicFramePr>
+            <p:xfrm>
+              <a:off x="6172200" y="1762812"/>
+              <a:ext cx="5181600" cy="4414151"/>
+            </p:xfrm>
+            <a:graphic>
+              <a:graphicData uri="http://schemas.microsoft.com/office/drawing/2014/chartex">
+                <cx:chart xmlns:cx="http://schemas.microsoft.com/office/drawing/2014/chartex" xmlns:r="http://schemas.openxmlformats.org/officeDocument/2006/relationships" r:id="rId3"/>
+              </a:graphicData>
+            </a:graphic>
+          </p:graphicFrame>
+        </mc:Choice>
+        <mc:Fallback xmlns="">
+          <p:pic>
+            <p:nvPicPr>
+              <p:cNvPr id="5" name="Content Placeholder 4">
+                <a:extLst>
+                  <a:ext uri="{FF2B5EF4-FFF2-40B4-BE49-F238E27FC236}">
+                    <a16:creationId xmlns:a16="http://schemas.microsoft.com/office/drawing/2014/main" id="{1745AF23-6658-194E-7C5D-204466C0B132}"/>
+                  </a:ext>
+                </a:extLst>
+              </p:cNvPr>
+              <p:cNvPicPr>
+                <a:picLocks noGrp="1" noRot="1" noChangeAspect="1" noMove="1" noResize="1" noEditPoints="1" noAdjustHandles="1" noChangeArrowheads="1" noChangeShapeType="1"/>
+              </p:cNvPicPr>
+              <p:nvPr/>
+            </p:nvPicPr>
+            <p:blipFill>
+              <a:blip r:embed="rId4"/>
+              <a:stretch>
+                <a:fillRect/>
+              </a:stretch>
+            </p:blipFill>
+            <p:spPr>
+              <a:xfrm>
+                <a:off x="6172200" y="1762812"/>
+                <a:ext cx="5181600" cy="4414151"/>
+              </a:xfrm>
+              <a:prstGeom prst="rect">
+                <a:avLst/>
+              </a:prstGeom>
+            </p:spPr>
+          </p:pic>
+        </mc:Fallback>
+      </mc:AlternateContent>
+    </p:spTree>
+    <p:extLst>
+      <p:ext uri="{BB962C8B-B14F-4D97-AF65-F5344CB8AC3E}">
+        <p14:creationId xmlns:p14="http://schemas.microsoft.com/office/powerpoint/2010/main" val="2276835088"/>
+      </p:ext>
+    </p:extLst>
+  </p:cSld>
+  <p:clrMapOvr>
+    <a:masterClrMapping/>
+  </p:clrMapOvr>
+</p:sld>
+</file>
+
+<file path=ppt/slides/slide6.xml><?xml version="1.0" encoding="utf-8"?>
+<p:sld xmlns:a="http://schemas.openxmlformats.org/drawingml/2006/main" xmlns:r="http://schemas.openxmlformats.org/officeDocument/2006/relationships" xmlns:p="http://schemas.openxmlformats.org/presentationml/2006/main">
+  <p:cSld>
+    <p:spTree>
+      <p:nvGrpSpPr>
+        <p:cNvPr id="1" name=""/>
+        <p:cNvGrpSpPr/>
+        <p:nvPr/>
+      </p:nvGrpSpPr>
+      <p:grpSpPr>
+        <a:xfrm>
+          <a:off x="0" y="0"/>
+          <a:ext cx="0" cy="0"/>
+          <a:chOff x="0" y="0"/>
+          <a:chExt cx="0" cy="0"/>
+        </a:xfrm>
+      </p:grpSpPr>
+      <p:sp>
+        <p:nvSpPr>
+          <p:cNvPr id="2" name="Title 1">
+            <a:extLst>
+              <a:ext uri="{FF2B5EF4-FFF2-40B4-BE49-F238E27FC236}">
+                <a16:creationId xmlns:a16="http://schemas.microsoft.com/office/drawing/2014/main" id="{C46A0DBE-3A6B-1B23-C8D2-4EDCFE56F760}"/>
+              </a:ext>
+            </a:extLst>
+          </p:cNvPr>
+          <p:cNvSpPr>
+            <a:spLocks noGrp="1"/>
+          </p:cNvSpPr>
+          <p:nvPr>
+            <p:ph type="title"/>
+          </p:nvPr>
+        </p:nvSpPr>
+        <p:spPr/>
+        <p:txBody>
+          <a:bodyPr>
+            <a:normAutofit/>
+          </a:bodyPr>
+          <a:lstStyle/>
+          <a:p>
+            <a:r>
+              <a:rPr lang="en-US" sz="3700" dirty="0"/>
+              <a:t>Task 2 : Composite Score at the End of 2022</a:t>
+            </a:r>
+          </a:p>
+        </p:txBody>
+      </p:sp>
+      <p:sp>
+        <p:nvSpPr>
+          <p:cNvPr id="3" name="Content Placeholder 2">
+            <a:extLst>
+              <a:ext uri="{FF2B5EF4-FFF2-40B4-BE49-F238E27FC236}">
+                <a16:creationId xmlns:a16="http://schemas.microsoft.com/office/drawing/2014/main" id="{BD48A00F-97C5-3C05-F5B0-05A4A0AC6B75}"/>
+              </a:ext>
+            </a:extLst>
+          </p:cNvPr>
+          <p:cNvSpPr>
+            <a:spLocks noGrp="1"/>
+          </p:cNvSpPr>
+          <p:nvPr>
+            <p:ph sz="half" idx="1"/>
+          </p:nvPr>
+        </p:nvSpPr>
+        <p:spPr>
+          <a:xfrm>
+            <a:off x="838200" y="1690688"/>
+            <a:ext cx="5181600" cy="4486275"/>
+          </a:xfrm>
+        </p:spPr>
+        <p:txBody>
+          <a:bodyPr>
+            <a:normAutofit fontScale="92500"/>
+          </a:bodyPr>
+          <a:lstStyle/>
+          <a:p>
+            <a:r>
+              <a:rPr lang="en-US" sz="2400" dirty="0"/>
+              <a:t>20</a:t>
+            </a:r>
+            <a:r>
+              <a:rPr lang="en-US" sz="2400" baseline="30000" dirty="0"/>
+              <a:t>th</a:t>
+            </a:r>
+            <a:r>
+              <a:rPr lang="en-US" sz="2400" dirty="0"/>
+              <a:t> Percentile : 395</a:t>
+            </a:r>
+          </a:p>
+          <a:p>
+            <a:r>
+              <a:rPr lang="en-US" sz="2400" dirty="0"/>
+              <a:t>40</a:t>
+            </a:r>
+            <a:r>
+              <a:rPr lang="en-US" sz="2400" baseline="30000" dirty="0"/>
+              <a:t>th</a:t>
+            </a:r>
+            <a:r>
+              <a:rPr lang="en-US" sz="2400" dirty="0"/>
+              <a:t> Percentile: 419</a:t>
+            </a:r>
+          </a:p>
+          <a:p>
+            <a:r>
+              <a:rPr lang="en-US" sz="2400" dirty="0"/>
+              <a:t>21 students in red with composite score range [358-385] needs intensive Support.</a:t>
+            </a:r>
+          </a:p>
+          <a:p>
+            <a:r>
+              <a:rPr lang="en-US" sz="2400" dirty="0"/>
+              <a:t>30 students in yellow with composite score range [385-412] needs Strategic Support.</a:t>
+            </a:r>
+          </a:p>
+          <a:p>
+            <a:r>
+              <a:rPr lang="en-US" sz="2400" dirty="0"/>
+              <a:t>35 students in green with score range [412,439] needs core support.</a:t>
+            </a:r>
+          </a:p>
+          <a:p>
+            <a:r>
+              <a:rPr lang="en-US" sz="2400" dirty="0"/>
+              <a:t>63 students in bule with score range [439, 466] , [466, 493], [493, 520],[520, 547], and [547, 574] needs Core plus support.</a:t>
+            </a:r>
+          </a:p>
+          <a:p>
+            <a:endParaRPr lang="en-US" dirty="0"/>
+          </a:p>
+        </p:txBody>
+      </p:sp>
+      <mc:AlternateContent xmlns:mc="http://schemas.openxmlformats.org/markup-compatibility/2006" xmlns:cx1="http://schemas.microsoft.com/office/drawing/2015/9/8/chartex">
+        <mc:Choice Requires="cx1">
+          <p:graphicFrame>
+            <p:nvGraphicFramePr>
+              <p:cNvPr id="5" name="Content Placeholder 4">
+                <a:extLst>
+                  <a:ext uri="{FF2B5EF4-FFF2-40B4-BE49-F238E27FC236}">
+                    <a16:creationId xmlns:a16="http://schemas.microsoft.com/office/drawing/2014/main" id="{155B4D2B-8C1B-F517-50A7-A92D9AFD7E5A}"/>
+                  </a:ext>
+                </a:extLst>
+              </p:cNvPr>
+              <p:cNvGraphicFramePr>
+                <a:graphicFrameLocks noGrp="1"/>
+              </p:cNvGraphicFramePr>
+              <p:nvPr>
+                <p:ph sz="half" idx="2"/>
+                <p:extLst>
+                  <p:ext uri="{D42A27DB-BD31-4B8C-83A1-F6EECF244321}">
+                    <p14:modId xmlns:p14="http://schemas.microsoft.com/office/powerpoint/2010/main" val="1248133842"/>
+                  </p:ext>
+                </p:extLst>
+              </p:nvPr>
+            </p:nvGraphicFramePr>
+            <p:xfrm>
+              <a:off x="6172200" y="1825625"/>
+              <a:ext cx="5181600" cy="4351338"/>
+            </p:xfrm>
+            <a:graphic>
+              <a:graphicData uri="http://schemas.microsoft.com/office/drawing/2014/chartex">
+                <cx:chart xmlns:cx="http://schemas.microsoft.com/office/drawing/2014/chartex" xmlns:r="http://schemas.openxmlformats.org/officeDocument/2006/relationships" r:id="rId3"/>
+              </a:graphicData>
+            </a:graphic>
+          </p:graphicFrame>
+        </mc:Choice>
+        <mc:Fallback xmlns="">
+          <p:pic>
+            <p:nvPicPr>
+              <p:cNvPr id="5" name="Content Placeholder 4">
+                <a:extLst>
+                  <a:ext uri="{FF2B5EF4-FFF2-40B4-BE49-F238E27FC236}">
+                    <a16:creationId xmlns:a16="http://schemas.microsoft.com/office/drawing/2014/main" id="{155B4D2B-8C1B-F517-50A7-A92D9AFD7E5A}"/>
+                  </a:ext>
+                </a:extLst>
+              </p:cNvPr>
+              <p:cNvPicPr>
+                <a:picLocks noGrp="1" noRot="1" noChangeAspect="1" noMove="1" noResize="1" noEditPoints="1" noAdjustHandles="1" noChangeArrowheads="1" noChangeShapeType="1"/>
+              </p:cNvPicPr>
+              <p:nvPr/>
+            </p:nvPicPr>
+            <p:blipFill>
+              <a:blip r:embed="rId4"/>
+              <a:stretch>
+                <a:fillRect/>
+              </a:stretch>
+            </p:blipFill>
+            <p:spPr>
+              <a:xfrm>
+                <a:off x="6172200" y="1825625"/>
+                <a:ext cx="5181600" cy="4351338"/>
+              </a:xfrm>
+              <a:prstGeom prst="rect">
+                <a:avLst/>
+              </a:prstGeom>
+            </p:spPr>
+          </p:pic>
+        </mc:Fallback>
+      </mc:AlternateContent>
+    </p:spTree>
+    <p:extLst>
+      <p:ext uri="{BB962C8B-B14F-4D97-AF65-F5344CB8AC3E}">
+        <p14:creationId xmlns:p14="http://schemas.microsoft.com/office/powerpoint/2010/main" val="1670029525"/>
+      </p:ext>
+    </p:extLst>
+  </p:cSld>
+  <p:clrMapOvr>
+    <a:masterClrMapping/>
+  </p:clrMapOvr>
+</p:sld>
+</file>
+
+<file path=ppt/slides/slide7.xml><?xml version="1.0" encoding="utf-8"?>
+<p:sld xmlns:a="http://schemas.openxmlformats.org/drawingml/2006/main" xmlns:r="http://schemas.openxmlformats.org/officeDocument/2006/relationships" xmlns:p="http://schemas.openxmlformats.org/presentationml/2006/main">
+  <p:cSld>
+    <p:spTree>
+      <p:nvGrpSpPr>
+        <p:cNvPr id="1" name=""/>
+        <p:cNvGrpSpPr/>
+        <p:nvPr/>
+      </p:nvGrpSpPr>
+      <p:grpSpPr>
+        <a:xfrm>
+          <a:off x="0" y="0"/>
+          <a:ext cx="0" cy="0"/>
+          <a:chOff x="0" y="0"/>
+          <a:chExt cx="0" cy="0"/>
+        </a:xfrm>
+      </p:grpSpPr>
+      <p:sp>
+        <p:nvSpPr>
+          <p:cNvPr id="2" name="Title 1">
+            <a:extLst>
+              <a:ext uri="{FF2B5EF4-FFF2-40B4-BE49-F238E27FC236}">
+                <a16:creationId xmlns:a16="http://schemas.microsoft.com/office/drawing/2014/main" id="{71F1D1A4-6B75-3576-7D07-75E2743D634A}"/>
+              </a:ext>
+            </a:extLst>
+          </p:cNvPr>
+          <p:cNvSpPr>
+            <a:spLocks noGrp="1"/>
+          </p:cNvSpPr>
+          <p:nvPr>
+            <p:ph type="title"/>
+          </p:nvPr>
+        </p:nvSpPr>
+        <p:spPr/>
+        <p:txBody>
+          <a:bodyPr/>
+          <a:lstStyle/>
+          <a:p>
+            <a:r>
+              <a:rPr lang="en-US"/>
+              <a:t>Task 2</a:t>
+            </a:r>
+          </a:p>
+        </p:txBody>
+      </p:sp>
+      <p:sp>
+        <p:nvSpPr>
+          <p:cNvPr id="3" name="Content Placeholder 2">
+            <a:extLst>
+              <a:ext uri="{FF2B5EF4-FFF2-40B4-BE49-F238E27FC236}">
+                <a16:creationId xmlns:a16="http://schemas.microsoft.com/office/drawing/2014/main" id="{35BA515C-B794-251E-206F-0E0D2386557D}"/>
+              </a:ext>
+            </a:extLst>
+          </p:cNvPr>
+          <p:cNvSpPr>
+            <a:spLocks noGrp="1"/>
+          </p:cNvSpPr>
+          <p:nvPr>
+            <p:ph idx="1"/>
+          </p:nvPr>
+        </p:nvSpPr>
+        <p:spPr/>
+        <p:txBody>
+          <a:bodyPr/>
+          <a:lstStyle/>
+          <a:p>
+            <a:endParaRPr lang="en-US"/>
+          </a:p>
+        </p:txBody>
+      </p:sp>
+    </p:spTree>
+    <p:extLst>
+      <p:ext uri="{BB962C8B-B14F-4D97-AF65-F5344CB8AC3E}">
+        <p14:creationId xmlns:p14="http://schemas.microsoft.com/office/powerpoint/2010/main" val="1260308952"/>
+      </p:ext>
+    </p:extLst>
+  </p:cSld>
+  <p:clrMapOvr>
+    <a:masterClrMapping/>
+  </p:clrMapOvr>
+</p:sld>
+</file>
+
+<file path=ppt/slides/slide8.xml><?xml version="1.0" encoding="utf-8"?>
+<p:sld xmlns:a="http://schemas.openxmlformats.org/drawingml/2006/main" xmlns:r="http://schemas.openxmlformats.org/officeDocument/2006/relationships" xmlns:p="http://schemas.openxmlformats.org/presentationml/2006/main">
+  <p:cSld>
+    <p:spTree>
+      <p:nvGrpSpPr>
+        <p:cNvPr id="1" name=""/>
+        <p:cNvGrpSpPr/>
+        <p:nvPr/>
+      </p:nvGrpSpPr>
+      <p:grpSpPr>
+        <a:xfrm>
+          <a:off x="0" y="0"/>
+          <a:ext cx="0" cy="0"/>
+          <a:chOff x="0" y="0"/>
+          <a:chExt cx="0" cy="0"/>
+        </a:xfrm>
+      </p:grpSpPr>
+      <p:sp>
+        <p:nvSpPr>
+          <p:cNvPr id="2" name="Title 1">
+            <a:extLst>
+              <a:ext uri="{FF2B5EF4-FFF2-40B4-BE49-F238E27FC236}">
+                <a16:creationId xmlns:a16="http://schemas.microsoft.com/office/drawing/2014/main" id="{C8592FCA-91FF-4DF7-DBD7-6EBC30FE7436}"/>
+              </a:ext>
+            </a:extLst>
+          </p:cNvPr>
+          <p:cNvSpPr>
+            <a:spLocks noGrp="1"/>
+          </p:cNvSpPr>
+          <p:nvPr>
+            <p:ph type="ctrTitle"/>
+          </p:nvPr>
+        </p:nvSpPr>
+        <p:spPr>
+          <a:xfrm>
+            <a:off x="76984" y="153077"/>
+            <a:ext cx="12038029" cy="716437"/>
+          </a:xfrm>
+        </p:spPr>
+        <p:txBody>
+          <a:bodyPr>
+            <a:normAutofit fontScale="90000"/>
+          </a:bodyPr>
+          <a:lstStyle/>
+          <a:p>
+            <a:r>
+              <a:rPr lang="en-US" b="1" dirty="0"/>
+              <a:t>Summary </a:t>
+            </a:r>
+          </a:p>
+        </p:txBody>
+      </p:sp>
+      <p:sp>
+        <p:nvSpPr>
+          <p:cNvPr id="4" name="Rectangle 1">
+            <a:extLst>
+              <a:ext uri="{FF2B5EF4-FFF2-40B4-BE49-F238E27FC236}">
+                <a16:creationId xmlns:a16="http://schemas.microsoft.com/office/drawing/2014/main" id="{1A3AC8FD-191D-6EB1-1A46-C2E2EBC7FA90}"/>
+              </a:ext>
+            </a:extLst>
+          </p:cNvPr>
+          <p:cNvSpPr>
+            <a:spLocks noGrp="1" noChangeArrowheads="1"/>
+          </p:cNvSpPr>
+          <p:nvPr>
+            <p:ph type="subTitle" idx="1"/>
+          </p:nvPr>
+        </p:nvSpPr>
+        <p:spPr bwMode="auto">
+          <a:xfrm>
+            <a:off x="241955" y="905232"/>
+            <a:ext cx="11786648" cy="2523768"/>
+          </a:xfrm>
+          <a:prstGeom prst="rect">
+            <a:avLst/>
+          </a:prstGeom>
+          <a:noFill/>
+          <a:ln>
+            <a:noFill/>
+          </a:ln>
+          <a:effectLst/>
+          <a:extLst>
+            <a:ext uri="{909E8E84-426E-40DD-AFC4-6F175D3DCCD1}">
+              <a14:hiddenFill xmlns:a14="http://schemas.microsoft.com/office/drawing/2010/main">
+                <a:solidFill>
+                  <a:schemeClr val="accent1"/>
+                </a:solidFill>
+              </a14:hiddenFill>
+            </a:ext>
+            <a:ext uri="{91240B29-F687-4F45-9708-019B960494DF}">
+              <a14:hiddenLine xmlns:a14="http://schemas.microsoft.com/office/drawing/2010/main" w="9525">
+                <a:solidFill>
+                  <a:schemeClr val="tx1"/>
+                </a:solidFill>
+                <a:miter lim="800000"/>
+                <a:headEnd/>
+                <a:tailEnd/>
+              </a14:hiddenLine>
+            </a:ext>
+            <a:ext uri="{AF507438-7753-43E0-B8FC-AC1667EBCBE1}">
+              <a14:hiddenEffects xmlns:a14="http://schemas.microsoft.com/office/drawing/2010/main">
+                <a:effectLst>
+                  <a:outerShdw dist="35921" dir="2700000" algn="ctr" rotWithShape="0">
+                    <a:schemeClr val="bg2"/>
+                  </a:outerShdw>
+                </a:effectLst>
+              </a14:hiddenEffects>
+            </a:ext>
+          </a:extLst>
+        </p:spPr>
+        <p:txBody>
+          <a:bodyPr vert="horz" wrap="square" lIns="91440" tIns="45720" rIns="91440" bIns="45720" numCol="1" anchor="ctr" anchorCtr="0" compatLnSpc="1">
+            <a:prstTxWarp prst="textNoShape">
+              <a:avLst/>
+            </a:prstTxWarp>
+            <a:spAutoFit/>
+          </a:bodyPr>
+          <a:lstStyle/>
+          <a:p>
+            <a:pPr marL="285750" marR="0" lvl="0" indent="-285750" algn="l" defTabSz="914400" rtl="0" eaLnBrk="0" fontAlgn="base" latinLnBrk="0" hangingPunct="0">
+              <a:lnSpc>
+                <a:spcPct val="100000"/>
+              </a:lnSpc>
+              <a:spcBef>
+                <a:spcPct val="0"/>
+              </a:spcBef>
+              <a:spcAft>
+                <a:spcPct val="0"/>
+              </a:spcAft>
+              <a:buClrTx/>
+              <a:buSzTx/>
+              <a:buFont typeface="Wingdings" panose="05000000000000000000" pitchFamily="2" charset="2"/>
+              <a:buChar char="v"/>
+              <a:tabLst/>
+            </a:pPr>
+            <a:r>
+              <a:rPr kumimoji="0" lang="en-US" altLang="en-US" sz="2000" b="1" i="0" u="none" strike="noStrike" cap="none" normalizeH="0" baseline="0" dirty="0">
+                <a:ln>
+                  <a:noFill/>
+                </a:ln>
+                <a:solidFill>
+                  <a:schemeClr val="tx1"/>
+                </a:solidFill>
+                <a:effectLst/>
+              </a:rPr>
+              <a:t>Improvement in Scores:</a:t>
+            </a:r>
+            <a:endParaRPr lang="en-US" altLang="en-US" sz="2000" dirty="0"/>
+          </a:p>
+          <a:p>
+            <a:pPr marL="800100" lvl="1" indent="-342900" algn="l" eaLnBrk="0" fontAlgn="base" hangingPunct="0">
+              <a:lnSpc>
+                <a:spcPct val="100000"/>
+              </a:lnSpc>
+              <a:spcBef>
+                <a:spcPct val="0"/>
+              </a:spcBef>
+              <a:spcAft>
+                <a:spcPct val="0"/>
+              </a:spcAft>
+              <a:buFont typeface="Arial" panose="020B0604020202020204" pitchFamily="34" charset="0"/>
+              <a:buChar char="•"/>
+            </a:pPr>
+            <a:r>
+              <a:rPr kumimoji="0" lang="en-US" altLang="en-US" sz="1600" b="0" i="0" u="none" strike="noStrike" cap="none" normalizeH="0" baseline="0" dirty="0">
+                <a:ln>
+                  <a:noFill/>
+                </a:ln>
+                <a:solidFill>
+                  <a:schemeClr val="tx1"/>
+                </a:solidFill>
+                <a:effectLst/>
+              </a:rPr>
+              <a:t>Student scores showed significant improvement from the beginning of 2021 to the end of 2021.</a:t>
+            </a:r>
+          </a:p>
+          <a:p>
+            <a:pPr marL="285750" marR="0" lvl="0" indent="-285750" algn="l" defTabSz="914400" rtl="0" eaLnBrk="0" fontAlgn="base" latinLnBrk="0" hangingPunct="0">
+              <a:lnSpc>
+                <a:spcPct val="100000"/>
+              </a:lnSpc>
+              <a:spcBef>
+                <a:spcPct val="0"/>
+              </a:spcBef>
+              <a:spcAft>
+                <a:spcPct val="0"/>
+              </a:spcAft>
+              <a:buClrTx/>
+              <a:buSzTx/>
+              <a:buFont typeface="Wingdings" panose="05000000000000000000" pitchFamily="2" charset="2"/>
+              <a:buChar char="v"/>
+              <a:tabLst/>
+            </a:pPr>
+            <a:r>
+              <a:rPr kumimoji="0" lang="en-US" altLang="en-US" sz="2000" b="1" i="0" u="none" strike="noStrike" cap="none" normalizeH="0" baseline="0" dirty="0">
+                <a:ln>
+                  <a:noFill/>
+                </a:ln>
+                <a:solidFill>
+                  <a:schemeClr val="tx1"/>
+                </a:solidFill>
+                <a:effectLst/>
+              </a:rPr>
+              <a:t>Support Levels:</a:t>
+            </a:r>
+            <a:endParaRPr kumimoji="0" lang="en-US" altLang="en-US" sz="2000" b="0" i="0" u="none" strike="noStrike" cap="none" normalizeH="0" baseline="0" dirty="0">
+              <a:ln>
+                <a:noFill/>
+              </a:ln>
+              <a:solidFill>
+                <a:schemeClr val="tx1"/>
+              </a:solidFill>
+              <a:effectLst/>
+            </a:endParaRPr>
+          </a:p>
+          <a:p>
+            <a:pPr lvl="1" algn="l" eaLnBrk="0" fontAlgn="base" hangingPunct="0">
+              <a:lnSpc>
+                <a:spcPct val="100000"/>
+              </a:lnSpc>
+              <a:spcBef>
+                <a:spcPct val="0"/>
+              </a:spcBef>
+              <a:spcAft>
+                <a:spcPct val="0"/>
+              </a:spcAft>
+              <a:buFontTx/>
+              <a:buChar char="•"/>
+            </a:pPr>
+            <a:r>
+              <a:rPr kumimoji="0" lang="en-US" altLang="en-US" b="0" i="0" u="none" strike="noStrike" cap="none" normalizeH="0" baseline="0" dirty="0">
+                <a:ln>
+                  <a:noFill/>
+                </a:ln>
+                <a:solidFill>
+                  <a:schemeClr val="tx1"/>
+                </a:solidFill>
+                <a:effectLst/>
+              </a:rPr>
+              <a:t> 	Fewer students needed </a:t>
+            </a:r>
+            <a:r>
+              <a:rPr kumimoji="0" lang="en-US" altLang="en-US" b="1" i="0" u="none" strike="noStrike" cap="none" normalizeH="0" baseline="0" dirty="0">
+                <a:ln>
+                  <a:noFill/>
+                </a:ln>
+                <a:solidFill>
+                  <a:schemeClr val="tx1"/>
+                </a:solidFill>
+                <a:effectLst/>
+              </a:rPr>
+              <a:t>Intensive Support</a:t>
+            </a:r>
+            <a:r>
+              <a:rPr kumimoji="0" lang="en-US" altLang="en-US" b="0" i="0" u="none" strike="noStrike" cap="none" normalizeH="0" baseline="0" dirty="0">
+                <a:ln>
+                  <a:noFill/>
+                </a:ln>
+                <a:solidFill>
+                  <a:schemeClr val="tx1"/>
+                </a:solidFill>
+                <a:effectLst/>
+              </a:rPr>
+              <a:t> (Red), decreasing from 21 to 14.</a:t>
+            </a:r>
+          </a:p>
+          <a:p>
+            <a:pPr lvl="1" algn="l" eaLnBrk="0" fontAlgn="base" hangingPunct="0">
+              <a:lnSpc>
+                <a:spcPct val="100000"/>
+              </a:lnSpc>
+              <a:spcBef>
+                <a:spcPct val="0"/>
+              </a:spcBef>
+              <a:spcAft>
+                <a:spcPct val="0"/>
+              </a:spcAft>
+              <a:buFontTx/>
+              <a:buChar char="•"/>
+            </a:pPr>
+            <a:r>
+              <a:rPr lang="en-US" altLang="en-US" dirty="0"/>
+              <a:t>     </a:t>
+            </a:r>
+            <a:r>
+              <a:rPr kumimoji="0" lang="en-US" altLang="en-US" b="0" i="0" u="none" strike="noStrike" cap="none" normalizeH="0" baseline="0" dirty="0">
+                <a:ln>
+                  <a:noFill/>
+                </a:ln>
+                <a:solidFill>
+                  <a:schemeClr val="tx1"/>
+                </a:solidFill>
+                <a:effectLst/>
+              </a:rPr>
+              <a:t> More students moved into </a:t>
+            </a:r>
+            <a:r>
+              <a:rPr kumimoji="0" lang="en-US" altLang="en-US" b="1" i="0" u="none" strike="noStrike" cap="none" normalizeH="0" baseline="0" dirty="0">
+                <a:ln>
+                  <a:noFill/>
+                </a:ln>
+                <a:solidFill>
+                  <a:schemeClr val="tx1"/>
+                </a:solidFill>
+                <a:effectLst/>
+              </a:rPr>
+              <a:t>Core Support</a:t>
+            </a:r>
+            <a:r>
+              <a:rPr kumimoji="0" lang="en-US" altLang="en-US" b="0" i="0" u="none" strike="noStrike" cap="none" normalizeH="0" baseline="0" dirty="0">
+                <a:ln>
+                  <a:noFill/>
+                </a:ln>
+                <a:solidFill>
+                  <a:schemeClr val="tx1"/>
+                </a:solidFill>
+                <a:effectLst/>
+              </a:rPr>
+              <a:t> (Green) and </a:t>
+            </a:r>
+            <a:r>
+              <a:rPr kumimoji="0" lang="en-US" altLang="en-US" b="1" i="0" u="none" strike="noStrike" cap="none" normalizeH="0" baseline="0" dirty="0">
+                <a:ln>
+                  <a:noFill/>
+                </a:ln>
+                <a:solidFill>
+                  <a:schemeClr val="tx1"/>
+                </a:solidFill>
+                <a:effectLst/>
+              </a:rPr>
+              <a:t>Core Plus Support</a:t>
+            </a:r>
+            <a:r>
+              <a:rPr kumimoji="0" lang="en-US" altLang="en-US" b="0" i="0" u="none" strike="noStrike" cap="none" normalizeH="0" baseline="0" dirty="0">
+                <a:ln>
+                  <a:noFill/>
+                </a:ln>
+                <a:solidFill>
+                  <a:schemeClr val="tx1"/>
+                </a:solidFill>
+                <a:effectLst/>
+              </a:rPr>
+              <a:t> (Blue), showing better overall performance.</a:t>
+            </a:r>
+          </a:p>
+          <a:p>
+            <a:pPr marL="342900" marR="0" lvl="0" indent="-342900" algn="l" defTabSz="914400" rtl="0" eaLnBrk="0" fontAlgn="base" latinLnBrk="0" hangingPunct="0">
+              <a:lnSpc>
+                <a:spcPct val="100000"/>
+              </a:lnSpc>
+              <a:spcBef>
+                <a:spcPct val="0"/>
+              </a:spcBef>
+              <a:spcAft>
+                <a:spcPct val="0"/>
+              </a:spcAft>
+              <a:buClrTx/>
+              <a:buSzTx/>
+              <a:buFont typeface="Wingdings" panose="05000000000000000000" pitchFamily="2" charset="2"/>
+              <a:buChar char="v"/>
+              <a:tabLst/>
+            </a:pPr>
+            <a:r>
+              <a:rPr lang="en-US" sz="2000" dirty="0"/>
+              <a:t>The data shows that more students improved their scores, requiring less support by the end of 2021.</a:t>
+            </a:r>
+          </a:p>
+          <a:p>
+            <a:pPr marL="0" marR="0" lvl="0" indent="0" algn="l" defTabSz="914400" rtl="0" eaLnBrk="0" fontAlgn="base" latinLnBrk="0" hangingPunct="0">
+              <a:lnSpc>
+                <a:spcPct val="100000"/>
+              </a:lnSpc>
+              <a:spcBef>
+                <a:spcPct val="0"/>
+              </a:spcBef>
+              <a:spcAft>
+                <a:spcPct val="0"/>
+              </a:spcAft>
+              <a:buClrTx/>
+              <a:buSzTx/>
+              <a:buFontTx/>
+              <a:buChar char="•"/>
+              <a:tabLst/>
+            </a:pPr>
+            <a:endParaRPr kumimoji="0" lang="en-US" altLang="en-US" sz="1800" b="0" i="0" u="none" strike="noStrike" cap="none" normalizeH="0" baseline="0" dirty="0">
+              <a:ln>
+                <a:noFill/>
+              </a:ln>
+              <a:solidFill>
+                <a:schemeClr val="tx1"/>
+              </a:solidFill>
+              <a:effectLst/>
+              <a:latin typeface="Arial" panose="020B0604020202020204" pitchFamily="34" charset="0"/>
+            </a:endParaRPr>
+          </a:p>
+        </p:txBody>
+      </p:sp>
+      <p:sp>
+        <p:nvSpPr>
+          <p:cNvPr id="6" name="TextBox 5">
+            <a:extLst>
+              <a:ext uri="{FF2B5EF4-FFF2-40B4-BE49-F238E27FC236}">
+                <a16:creationId xmlns:a16="http://schemas.microsoft.com/office/drawing/2014/main" id="{80A86E3C-DE59-8429-8A7B-ABBB2CA8733E}"/>
+              </a:ext>
+            </a:extLst>
+          </p:cNvPr>
+          <p:cNvSpPr txBox="1"/>
+          <p:nvPr/>
+        </p:nvSpPr>
+        <p:spPr>
+          <a:xfrm>
+            <a:off x="241954" y="3500436"/>
+            <a:ext cx="11708090" cy="2554545"/>
+          </a:xfrm>
+          <a:prstGeom prst="rect">
+            <a:avLst/>
+          </a:prstGeom>
+          <a:noFill/>
+        </p:spPr>
+        <p:txBody>
+          <a:bodyPr wrap="square">
+            <a:spAutoFit/>
+          </a:bodyPr>
+          <a:lstStyle/>
+          <a:p>
+            <a:pPr marL="342900" indent="-342900">
+              <a:buFont typeface="Wingdings" panose="05000000000000000000" pitchFamily="2" charset="2"/>
+              <a:buChar char="v"/>
+            </a:pPr>
+            <a:r>
+              <a:rPr lang="en-US" sz="2000" b="1" dirty="0"/>
+              <a:t>Improvement in Scores:</a:t>
+            </a:r>
+          </a:p>
+          <a:p>
+            <a:pPr marL="742950" lvl="1" indent="-285750">
+              <a:buFont typeface="Arial" panose="020B0604020202020204" pitchFamily="34" charset="0"/>
+              <a:buChar char="•"/>
+            </a:pPr>
+            <a:r>
+              <a:rPr lang="en-US" sz="2000" dirty="0"/>
+              <a:t>Student scores improved significantly from the beginning of 2022 to the end of 2022.</a:t>
+            </a:r>
+          </a:p>
+          <a:p>
+            <a:pPr marL="342900" indent="-342900">
+              <a:buFont typeface="Wingdings" panose="05000000000000000000" pitchFamily="2" charset="2"/>
+              <a:buChar char="v"/>
+            </a:pPr>
+            <a:r>
+              <a:rPr lang="en-US" sz="2000" b="1" dirty="0"/>
+              <a:t>Support Levels:</a:t>
+            </a:r>
+            <a:endParaRPr lang="en-US" sz="2000" dirty="0"/>
+          </a:p>
+          <a:p>
+            <a:pPr marL="742950" lvl="1" indent="-285750">
+              <a:buFont typeface="Arial" panose="020B0604020202020204" pitchFamily="34" charset="0"/>
+              <a:buChar char="•"/>
+            </a:pPr>
+            <a:r>
+              <a:rPr lang="en-US" sz="2000" dirty="0"/>
+              <a:t>Fewer students needed </a:t>
+            </a:r>
+            <a:r>
+              <a:rPr lang="en-US" sz="2000" b="1" dirty="0"/>
+              <a:t>Intensive Support</a:t>
+            </a:r>
+            <a:r>
+              <a:rPr lang="en-US" sz="2000" dirty="0"/>
+              <a:t> (Red), down from 30 to 21.</a:t>
+            </a:r>
+          </a:p>
+          <a:p>
+            <a:pPr marL="742950" lvl="1" indent="-285750">
+              <a:buFont typeface="Arial" panose="020B0604020202020204" pitchFamily="34" charset="0"/>
+              <a:buChar char="•"/>
+            </a:pPr>
+            <a:r>
+              <a:rPr lang="en-US" sz="2000" dirty="0"/>
+              <a:t>More students required </a:t>
+            </a:r>
+            <a:r>
+              <a:rPr lang="en-US" sz="2000" b="1" dirty="0"/>
+              <a:t>Strategic Support</a:t>
+            </a:r>
+            <a:r>
+              <a:rPr lang="en-US" sz="2000" dirty="0"/>
+              <a:t> (Yellow) and </a:t>
+            </a:r>
+            <a:r>
+              <a:rPr lang="en-US" sz="2000" b="1" dirty="0"/>
+              <a:t>Core Support</a:t>
+            </a:r>
+            <a:r>
+              <a:rPr lang="en-US" sz="2000" dirty="0"/>
+              <a:t> (Green).</a:t>
+            </a:r>
+          </a:p>
+          <a:p>
+            <a:pPr marL="742950" lvl="1" indent="-285750">
+              <a:buFont typeface="Arial" panose="020B0604020202020204" pitchFamily="34" charset="0"/>
+              <a:buChar char="•"/>
+            </a:pPr>
+            <a:r>
+              <a:rPr lang="en-US" sz="2000" b="1" dirty="0"/>
+              <a:t>Core Plus Support</a:t>
+            </a:r>
+            <a:r>
+              <a:rPr lang="en-US" sz="2000" dirty="0"/>
+              <a:t> (Blue) decreased from 75 to 63, but those remaining had higher scores.</a:t>
+            </a:r>
+          </a:p>
+          <a:p>
+            <a:pPr marL="285750" indent="-285750">
+              <a:buFont typeface="Wingdings" panose="05000000000000000000" pitchFamily="2" charset="2"/>
+              <a:buChar char="v"/>
+            </a:pPr>
+            <a:r>
+              <a:rPr lang="en-US" sz="2000" dirty="0"/>
+              <a:t>Overall, more students improved, requiring less intensive support, and moved into higher support categories by the end of 2022.</a:t>
+            </a:r>
+          </a:p>
+        </p:txBody>
+      </p:sp>
+    </p:spTree>
+    <p:extLst>
+      <p:ext uri="{BB962C8B-B14F-4D97-AF65-F5344CB8AC3E}">
+        <p14:creationId xmlns:p14="http://schemas.microsoft.com/office/powerpoint/2010/main" val="4034437497"/>
+      </p:ext>
+    </p:extLst>
+  </p:cSld>
+  <p:clrMapOvr>
+    <a:masterClrMapping/>
+  </p:clrMapOvr>
+</p:sld>
+</file>
+
+<file path=ppt/slides/slide9.xml><?xml version="1.0" encoding="utf-8"?>
+<p:sld xmlns:a="http://schemas.openxmlformats.org/drawingml/2006/main" xmlns:r="http://schemas.openxmlformats.org/officeDocument/2006/relationships" xmlns:p="http://schemas.openxmlformats.org/presentationml/2006/main">
+  <p:cSld>
+    <p:spTree>
+      <p:nvGrpSpPr>
+        <p:cNvPr id="1" name=""/>
+        <p:cNvGrpSpPr/>
+        <p:nvPr/>
+      </p:nvGrpSpPr>
+      <p:grpSpPr>
+        <a:xfrm>
+          <a:off x="0" y="0"/>
+          <a:ext cx="0" cy="0"/>
+          <a:chOff x="0" y="0"/>
+          <a:chExt cx="0" cy="0"/>
+        </a:xfrm>
+      </p:grpSpPr>
+      <p:sp>
+        <p:nvSpPr>
+          <p:cNvPr id="2" name="Title 1">
+            <a:extLst>
+              <a:ext uri="{FF2B5EF4-FFF2-40B4-BE49-F238E27FC236}">
+                <a16:creationId xmlns:a16="http://schemas.microsoft.com/office/drawing/2014/main" id="{58E50CDF-2EB9-E47F-DE65-BEAB568DBE48}"/>
+              </a:ext>
+            </a:extLst>
+          </p:cNvPr>
+          <p:cNvSpPr>
+            <a:spLocks noGrp="1"/>
+          </p:cNvSpPr>
+          <p:nvPr>
+            <p:ph type="ctrTitle"/>
+          </p:nvPr>
+        </p:nvSpPr>
+        <p:spPr/>
+        <p:txBody>
+          <a:bodyPr/>
+          <a:lstStyle/>
+          <a:p>
+            <a:endParaRPr lang="en-US"/>
+          </a:p>
+        </p:txBody>
+      </p:sp>
+      <p:sp>
+        <p:nvSpPr>
+          <p:cNvPr id="3" name="Subtitle 2">
+            <a:extLst>
+              <a:ext uri="{FF2B5EF4-FFF2-40B4-BE49-F238E27FC236}">
+                <a16:creationId xmlns:a16="http://schemas.microsoft.com/office/drawing/2014/main" id="{C134C56F-5184-B1D2-75BC-64AC57557074}"/>
+              </a:ext>
+            </a:extLst>
+          </p:cNvPr>
+          <p:cNvSpPr>
+            <a:spLocks noGrp="1"/>
+          </p:cNvSpPr>
+          <p:nvPr>
+            <p:ph type="subTitle" idx="1"/>
+          </p:nvPr>
+        </p:nvSpPr>
+        <p:spPr/>
+        <p:txBody>
+          <a:bodyPr/>
+          <a:lstStyle/>
+          <a:p>
+            <a:endParaRPr lang="en-US"/>
+          </a:p>
+        </p:txBody>
+      </p:sp>
+    </p:spTree>
+    <p:extLst>
+      <p:ext uri="{BB962C8B-B14F-4D97-AF65-F5344CB8AC3E}">
+        <p14:creationId xmlns:p14="http://schemas.microsoft.com/office/powerpoint/2010/main" val="998965808"/>
       </p:ext>
     </p:extLst>
   </p:cSld>
@@ -5613,4 +9083,299 @@
     </a:ext>
   </a:extLst>
 </a:theme>
+</file>
+
+<file path=ppt/theme/theme2.xml><?xml version="1.0" encoding="utf-8"?>
+<a:theme xmlns:a="http://schemas.openxmlformats.org/drawingml/2006/main" name="Office Theme">
+  <a:themeElements>
+    <a:clrScheme name="Office">
+      <a:dk1>
+        <a:sysClr val="windowText" lastClr="000000"/>
+      </a:dk1>
+      <a:lt1>
+        <a:sysClr val="window" lastClr="FFFFFF"/>
+      </a:lt1>
+      <a:dk2>
+        <a:srgbClr val="44546A"/>
+      </a:dk2>
+      <a:lt2>
+        <a:srgbClr val="E7E6E6"/>
+      </a:lt2>
+      <a:accent1>
+        <a:srgbClr val="4472C4"/>
+      </a:accent1>
+      <a:accent2>
+        <a:srgbClr val="ED7D31"/>
+      </a:accent2>
+      <a:accent3>
+        <a:srgbClr val="A5A5A5"/>
+      </a:accent3>
+      <a:accent4>
+        <a:srgbClr val="FFC000"/>
+      </a:accent4>
+      <a:accent5>
+        <a:srgbClr val="5B9BD5"/>
+      </a:accent5>
+      <a:accent6>
+        <a:srgbClr val="70AD47"/>
+      </a:accent6>
+      <a:hlink>
+        <a:srgbClr val="0563C1"/>
+      </a:hlink>
+      <a:folHlink>
+        <a:srgbClr val="954F72"/>
+      </a:folHlink>
+    </a:clrScheme>
+    <a:fontScheme name="Office">
+      <a:majorFont>
+        <a:latin typeface="Calibri Light" panose="020F0302020204030204"/>
+        <a:ea typeface=""/>
+        <a:cs typeface=""/>
+        <a:font script="Jpan" typeface="游ゴシック Light"/>
+        <a:font script="Hang" typeface="맑은 고딕"/>
+        <a:font script="Hans" typeface="等线 Light"/>
+        <a:font script="Hant" typeface="新細明體"/>
+        <a:font script="Arab" typeface="Times New Roman"/>
+        <a:font script="Hebr" typeface="Times New Roman"/>
+        <a:font script="Thai" typeface="Angsana New"/>
+        <a:font script="Ethi" typeface="Nyala"/>
+        <a:font script="Beng" typeface="Vrinda"/>
+        <a:font script="Gujr" typeface="Shruti"/>
+        <a:font script="Khmr" typeface="MoolBoran"/>
+        <a:font script="Knda" typeface="Tunga"/>
+        <a:font script="Guru" typeface="Raavi"/>
+        <a:font script="Cans" typeface="Euphemia"/>
+        <a:font script="Cher" typeface="Plantagenet Cherokee"/>
+        <a:font script="Yiii" typeface="Microsoft Yi Baiti"/>
+        <a:font script="Tibt" typeface="Microsoft Himalaya"/>
+        <a:font script="Thaa" typeface="MV Boli"/>
+        <a:font script="Deva" typeface="Mangal"/>
+        <a:font script="Telu" typeface="Gautami"/>
+        <a:font script="Taml" typeface="Latha"/>
+        <a:font script="Syrc" typeface="Estrangelo Edessa"/>
+        <a:font script="Orya" typeface="Kalinga"/>
+        <a:font script="Mlym" typeface="Kartika"/>
+        <a:font script="Laoo" typeface="DokChampa"/>
+        <a:font script="Sinh" typeface="Iskoola Pota"/>
+        <a:font script="Mong" typeface="Mongolian Baiti"/>
+        <a:font script="Viet" typeface="Times New Roman"/>
+        <a:font script="Uigh" typeface="Microsoft Uighur"/>
+        <a:font script="Geor" typeface="Sylfaen"/>
+        <a:font script="Armn" typeface="Arial"/>
+        <a:font script="Bugi" typeface="Leelawadee UI"/>
+        <a:font script="Bopo" typeface="Microsoft JhengHei"/>
+        <a:font script="Java" typeface="Javanese Text"/>
+        <a:font script="Lisu" typeface="Segoe UI"/>
+        <a:font script="Mymr" typeface="Myanmar Text"/>
+        <a:font script="Nkoo" typeface="Ebrima"/>
+        <a:font script="Olck" typeface="Nirmala UI"/>
+        <a:font script="Osma" typeface="Ebrima"/>
+        <a:font script="Phag" typeface="Phagspa"/>
+        <a:font script="Syrn" typeface="Estrangelo Edessa"/>
+        <a:font script="Syrj" typeface="Estrangelo Edessa"/>
+        <a:font script="Syre" typeface="Estrangelo Edessa"/>
+        <a:font script="Sora" typeface="Nirmala UI"/>
+        <a:font script="Tale" typeface="Microsoft Tai Le"/>
+        <a:font script="Talu" typeface="Microsoft New Tai Lue"/>
+        <a:font script="Tfng" typeface="Ebrima"/>
+      </a:majorFont>
+      <a:minorFont>
+        <a:latin typeface="Calibri" panose="020F0502020204030204"/>
+        <a:ea typeface=""/>
+        <a:cs typeface=""/>
+        <a:font script="Jpan" typeface="游ゴシック"/>
+        <a:font script="Hang" typeface="맑은 고딕"/>
+        <a:font script="Hans" typeface="等线"/>
+        <a:font script="Hant" typeface="新細明體"/>
+        <a:font script="Arab" typeface="Arial"/>
+        <a:font script="Hebr" typeface="Arial"/>
+        <a:font script="Thai" typeface="Cordia New"/>
+        <a:font script="Ethi" typeface="Nyala"/>
+        <a:font script="Beng" typeface="Vrinda"/>
+        <a:font script="Gujr" typeface="Shruti"/>
+        <a:font script="Khmr" typeface="DaunPenh"/>
+        <a:font script="Knda" typeface="Tunga"/>
+        <a:font script="Guru" typeface="Raavi"/>
+        <a:font script="Cans" typeface="Euphemia"/>
+        <a:font script="Cher" typeface="Plantagenet Cherokee"/>
+        <a:font script="Yiii" typeface="Microsoft Yi Baiti"/>
+        <a:font script="Tibt" typeface="Microsoft Himalaya"/>
+        <a:font script="Thaa" typeface="MV Boli"/>
+        <a:font script="Deva" typeface="Mangal"/>
+        <a:font script="Telu" typeface="Gautami"/>
+        <a:font script="Taml" typeface="Latha"/>
+        <a:font script="Syrc" typeface="Estrangelo Edessa"/>
+        <a:font script="Orya" typeface="Kalinga"/>
+        <a:font script="Mlym" typeface="Kartika"/>
+        <a:font script="Laoo" typeface="DokChampa"/>
+        <a:font script="Sinh" typeface="Iskoola Pota"/>
+        <a:font script="Mong" typeface="Mongolian Baiti"/>
+        <a:font script="Viet" typeface="Arial"/>
+        <a:font script="Uigh" typeface="Microsoft Uighur"/>
+        <a:font script="Geor" typeface="Sylfaen"/>
+        <a:font script="Armn" typeface="Arial"/>
+        <a:font script="Bugi" typeface="Leelawadee UI"/>
+        <a:font script="Bopo" typeface="Microsoft JhengHei"/>
+        <a:font script="Java" typeface="Javanese Text"/>
+        <a:font script="Lisu" typeface="Segoe UI"/>
+        <a:font script="Mymr" typeface="Myanmar Text"/>
+        <a:font script="Nkoo" typeface="Ebrima"/>
+        <a:font script="Olck" typeface="Nirmala UI"/>
+        <a:font script="Osma" typeface="Ebrima"/>
+        <a:font script="Phag" typeface="Phagspa"/>
+        <a:font script="Syrn" typeface="Estrangelo Edessa"/>
+        <a:font script="Syrj" typeface="Estrangelo Edessa"/>
+        <a:font script="Syre" typeface="Estrangelo Edessa"/>
+        <a:font script="Sora" typeface="Nirmala UI"/>
+        <a:font script="Tale" typeface="Microsoft Tai Le"/>
+        <a:font script="Talu" typeface="Microsoft New Tai Lue"/>
+        <a:font script="Tfng" typeface="Ebrima"/>
+      </a:minorFont>
+    </a:fontScheme>
+    <a:fmtScheme name="Office">
+      <a:fillStyleLst>
+        <a:solidFill>
+          <a:schemeClr val="phClr"/>
+        </a:solidFill>
+        <a:gradFill rotWithShape="1">
+          <a:gsLst>
+            <a:gs pos="0">
+              <a:schemeClr val="phClr">
+                <a:lumMod val="110000"/>
+                <a:satMod val="105000"/>
+                <a:tint val="67000"/>
+              </a:schemeClr>
+            </a:gs>
+            <a:gs pos="50000">
+              <a:schemeClr val="phClr">
+                <a:lumMod val="105000"/>
+                <a:satMod val="103000"/>
+                <a:tint val="73000"/>
+              </a:schemeClr>
+            </a:gs>
+            <a:gs pos="100000">
+              <a:schemeClr val="phClr">
+                <a:lumMod val="105000"/>
+                <a:satMod val="109000"/>
+                <a:tint val="81000"/>
+              </a:schemeClr>
+            </a:gs>
+          </a:gsLst>
+          <a:lin ang="5400000" scaled="0"/>
+        </a:gradFill>
+        <a:gradFill rotWithShape="1">
+          <a:gsLst>
+            <a:gs pos="0">
+              <a:schemeClr val="phClr">
+                <a:satMod val="103000"/>
+                <a:lumMod val="102000"/>
+                <a:tint val="94000"/>
+              </a:schemeClr>
+            </a:gs>
+            <a:gs pos="50000">
+              <a:schemeClr val="phClr">
+                <a:satMod val="110000"/>
+                <a:lumMod val="100000"/>
+                <a:shade val="100000"/>
+              </a:schemeClr>
+            </a:gs>
+            <a:gs pos="100000">
+              <a:schemeClr val="phClr">
+                <a:lumMod val="99000"/>
+                <a:satMod val="120000"/>
+                <a:shade val="78000"/>
+              </a:schemeClr>
+            </a:gs>
+          </a:gsLst>
+          <a:lin ang="5400000" scaled="0"/>
+        </a:gradFill>
+      </a:fillStyleLst>
+      <a:lnStyleLst>
+        <a:ln w="6350" cap="flat" cmpd="sng" algn="ctr">
+          <a:solidFill>
+            <a:schemeClr val="phClr"/>
+          </a:solidFill>
+          <a:prstDash val="solid"/>
+          <a:miter lim="800000"/>
+        </a:ln>
+        <a:ln w="12700" cap="flat" cmpd="sng" algn="ctr">
+          <a:solidFill>
+            <a:schemeClr val="phClr"/>
+          </a:solidFill>
+          <a:prstDash val="solid"/>
+          <a:miter lim="800000"/>
+        </a:ln>
+        <a:ln w="19050" cap="flat" cmpd="sng" algn="ctr">
+          <a:solidFill>
+            <a:schemeClr val="phClr"/>
+          </a:solidFill>
+          <a:prstDash val="solid"/>
+          <a:miter lim="800000"/>
+        </a:ln>
+      </a:lnStyleLst>
+      <a:effectStyleLst>
+        <a:effectStyle>
+          <a:effectLst/>
+        </a:effectStyle>
+        <a:effectStyle>
+          <a:effectLst/>
+        </a:effectStyle>
+        <a:effectStyle>
+          <a:effectLst>
+            <a:outerShdw blurRad="57150" dist="19050" dir="5400000" algn="ctr" rotWithShape="0">
+              <a:srgbClr val="000000">
+                <a:alpha val="63000"/>
+              </a:srgbClr>
+            </a:outerShdw>
+          </a:effectLst>
+        </a:effectStyle>
+      </a:effectStyleLst>
+      <a:bgFillStyleLst>
+        <a:solidFill>
+          <a:schemeClr val="phClr"/>
+        </a:solidFill>
+        <a:solidFill>
+          <a:schemeClr val="phClr">
+            <a:tint val="95000"/>
+            <a:satMod val="170000"/>
+          </a:schemeClr>
+        </a:solidFill>
+        <a:gradFill rotWithShape="1">
+          <a:gsLst>
+            <a:gs pos="0">
+              <a:schemeClr val="phClr">
+                <a:tint val="93000"/>
+                <a:satMod val="150000"/>
+                <a:shade val="98000"/>
+                <a:lumMod val="102000"/>
+              </a:schemeClr>
+            </a:gs>
+            <a:gs pos="50000">
+              <a:schemeClr val="phClr">
+                <a:tint val="98000"/>
+                <a:satMod val="130000"/>
+                <a:shade val="90000"/>
+                <a:lumMod val="103000"/>
+              </a:schemeClr>
+            </a:gs>
+            <a:gs pos="100000">
+              <a:schemeClr val="phClr">
+                <a:shade val="63000"/>
+                <a:satMod val="120000"/>
+              </a:schemeClr>
+            </a:gs>
+          </a:gsLst>
+          <a:lin ang="5400000" scaled="0"/>
+        </a:gradFill>
+      </a:bgFillStyleLst>
+    </a:fmtScheme>
+  </a:themeElements>
+  <a:objectDefaults/>
+  <a:extraClrSchemeLst/>
+  <a:extLst>
+    <a:ext uri="{05A4C25C-085E-4340-85A3-A5531E510DB2}">
+      <thm15:themeFamily xmlns:thm15="http://schemas.microsoft.com/office/thememl/2012/main" name="Office Theme" id="{62F939B6-93AF-4DB8-9C6B-D6C7DFDC589F}" vid="{4A3C46E8-61CC-4603-A589-7422A47A8E4A}"/>
+    </a:ext>
+  </a:extLst>
+</a:theme>
 </file>
</xml_diff>

<commit_message>
Adding all the tasks to git hub
</commit_message>
<xml_diff>
--- a/SirjanaBhatta-SouthbridgePublicSchools.pptx
+++ b/SirjanaBhatta-SouthbridgePublicSchools.pptx
@@ -6142,14 +6142,21 @@
             <p:ph type="title"/>
           </p:nvPr>
         </p:nvSpPr>
-        <p:spPr/>
-        <p:txBody>
-          <a:bodyPr/>
+        <p:spPr>
+          <a:xfrm>
+            <a:off x="160256" y="18256"/>
+            <a:ext cx="11924907" cy="1254364"/>
+          </a:xfrm>
+        </p:spPr>
+        <p:txBody>
+          <a:bodyPr>
+            <a:normAutofit/>
+          </a:bodyPr>
           <a:lstStyle/>
           <a:p>
             <a:pPr algn="ctr"/>
             <a:r>
-              <a:rPr lang="en-US" dirty="0"/>
+              <a:rPr lang="en-US" sz="4000" b="1" dirty="0"/>
               <a:t>Summary</a:t>
             </a:r>
           </a:p>
@@ -6171,19 +6178,32 @@
             <p:ph idx="1"/>
           </p:nvPr>
         </p:nvSpPr>
-        <p:spPr/>
+        <p:spPr>
+          <a:xfrm>
+            <a:off x="791065" y="1253331"/>
+            <a:ext cx="9455871" cy="4351338"/>
+          </a:xfrm>
+        </p:spPr>
         <p:txBody>
           <a:bodyPr/>
           <a:lstStyle/>
           <a:p>
-            <a:r>
-              <a:rPr lang="en-US" dirty="0"/>
+            <a:pPr>
+              <a:buFont typeface="Wingdings" panose="05000000000000000000" pitchFamily="2" charset="2"/>
+              <a:buChar char="§"/>
+            </a:pPr>
+            <a:r>
+              <a:rPr lang="en-US" sz="2000" dirty="0"/>
               <a:t>Based on the histogram, the composite score improved at the end of 2021 compared to the beginning of 2021. Fewer students required intensive support at the end of 2021.</a:t>
             </a:r>
           </a:p>
           <a:p>
-            <a:r>
-              <a:rPr lang="en-US" dirty="0"/>
+            <a:pPr>
+              <a:buFont typeface="Wingdings" panose="05000000000000000000" pitchFamily="2" charset="2"/>
+              <a:buChar char="§"/>
+            </a:pPr>
+            <a:r>
+              <a:rPr lang="en-US" sz="2000" dirty="0"/>
               <a:t>Similarly, based on the histogram, the composite score improved at the end of 2022 compared to the beginning of 2022. Fewer students required intensive and strategic support at the end of 2022.</a:t>
             </a:r>
           </a:p>
@@ -6243,7 +6263,7 @@
         </p:nvSpPr>
         <p:spPr>
           <a:xfrm>
-            <a:off x="804862" y="600075"/>
+            <a:off x="804862" y="383259"/>
             <a:ext cx="10582276" cy="5591174"/>
           </a:xfrm>
         </p:spPr>
@@ -6268,46 +6288,46 @@
               </a:rPr>
             </a:br>
             <a:r>
-              <a:rPr lang="en-US" sz="2200" b="1" dirty="0">
+              <a:rPr lang="en-US" sz="2000" b="1" dirty="0">
                 <a:latin typeface="+mn-lt"/>
               </a:rPr>
               <a:t>1. Composite Score at the Beginning of 2021</a:t>
             </a:r>
             <a:br>
-              <a:rPr lang="en-US" sz="2200" b="1" dirty="0">
+              <a:rPr lang="en-US" sz="2000" b="1" dirty="0">
                 <a:latin typeface="+mn-lt"/>
               </a:rPr>
             </a:br>
             <a:r>
-              <a:rPr lang="en-US" sz="2200" b="1" dirty="0">
+              <a:rPr lang="en-US" sz="2000" b="1" dirty="0">
                 <a:latin typeface="+mn-lt"/>
               </a:rPr>
               <a:t>2. Composite Score at the End of 2021</a:t>
             </a:r>
             <a:br>
-              <a:rPr lang="en-US" sz="2200" b="1" dirty="0">
+              <a:rPr lang="en-US" sz="2000" b="1" dirty="0">
                 <a:latin typeface="+mn-lt"/>
               </a:rPr>
             </a:br>
             <a:r>
-              <a:rPr lang="en-US" sz="2200" b="1" dirty="0">
+              <a:rPr lang="en-US" sz="2000" b="1" dirty="0">
                 <a:latin typeface="+mn-lt"/>
               </a:rPr>
               <a:t>3. Composite Score at the Beginning of 2022</a:t>
             </a:r>
             <a:br>
-              <a:rPr lang="en-US" sz="2200" b="1" dirty="0">
+              <a:rPr lang="en-US" sz="2000" b="1" dirty="0">
                 <a:latin typeface="+mn-lt"/>
               </a:rPr>
             </a:br>
             <a:r>
-              <a:rPr lang="en-US" sz="2200" b="1" dirty="0">
+              <a:rPr lang="en-US" sz="2000" b="1" dirty="0">
                 <a:latin typeface="+mn-lt"/>
               </a:rPr>
               <a:t>4. Composite Score at the End of 2022</a:t>
             </a:r>
             <a:br>
-              <a:rPr lang="en-US" sz="2200" b="1" dirty="0">
+              <a:rPr lang="en-US" sz="2000" b="1" dirty="0">
                 <a:latin typeface="+mn-lt"/>
               </a:rPr>
             </a:br>
@@ -6329,7 +6349,7 @@
               <a:rPr lang="en-US" sz="4400" b="1" dirty="0"/>
             </a:br>
             <a:r>
-              <a:rPr lang="en-US" sz="2200" b="1" u="none" strike="noStrike" dirty="0">
+              <a:rPr lang="en-US" sz="2000" b="1" u="none" strike="noStrike" dirty="0">
                 <a:solidFill>
                   <a:srgbClr val="000000"/>
                 </a:solidFill>
@@ -6339,13 +6359,13 @@
               <a:t>1. EPIMS9400 - Missing WA08 Assignment Code</a:t>
             </a:r>
             <a:br>
-              <a:rPr lang="en-US" sz="2200" b="1" dirty="0">
+              <a:rPr lang="en-US" sz="2000" b="1" dirty="0">
                 <a:effectLst/>
                 <a:latin typeface="+mn-lt"/>
               </a:rPr>
             </a:br>
             <a:r>
-              <a:rPr lang="en-US" sz="2200" b="1" u="none" strike="noStrike" dirty="0">
+              <a:rPr lang="en-US" sz="2000" b="1" u="none" strike="noStrike" dirty="0">
                 <a:solidFill>
                   <a:srgbClr val="000000"/>
                 </a:solidFill>
@@ -6355,13 +6375,13 @@
               <a:t>2. Missing Schedule Term Column</a:t>
             </a:r>
             <a:br>
-              <a:rPr lang="en-US" sz="2200" b="1" dirty="0">
+              <a:rPr lang="en-US" sz="2000" b="1" dirty="0">
                 <a:effectLst/>
                 <a:latin typeface="+mn-lt"/>
               </a:rPr>
             </a:br>
             <a:r>
-              <a:rPr lang="en-US" sz="2200" b="1" u="none" strike="noStrike" dirty="0">
+              <a:rPr lang="en-US" sz="2000" b="1" u="none" strike="noStrike" dirty="0">
                 <a:solidFill>
                   <a:srgbClr val="000000"/>
                 </a:solidFill>
@@ -6371,13 +6391,13 @@
               <a:t>3. Missing Gradebook Access Column</a:t>
             </a:r>
             <a:br>
-              <a:rPr lang="en-US" sz="2200" b="1" dirty="0">
+              <a:rPr lang="en-US" sz="2000" b="1" dirty="0">
                 <a:effectLst/>
                 <a:latin typeface="+mn-lt"/>
               </a:rPr>
             </a:br>
             <a:r>
-              <a:rPr lang="en-US" sz="2200" b="1" u="none" strike="noStrike" dirty="0">
+              <a:rPr lang="en-US" sz="2000" b="1" u="none" strike="noStrike" dirty="0">
                 <a:solidFill>
                   <a:srgbClr val="000000"/>
                 </a:solidFill>
@@ -6387,13 +6407,13 @@
               <a:t>4. EPIMS6750 - Co-Teaching Assignment Must Be Between 2 and 4</a:t>
             </a:r>
             <a:br>
-              <a:rPr lang="en-US" sz="2200" b="1" dirty="0">
+              <a:rPr lang="en-US" sz="2000" b="1" dirty="0">
                 <a:effectLst/>
                 <a:latin typeface="+mn-lt"/>
               </a:rPr>
             </a:br>
             <a:r>
-              <a:rPr lang="en-US" sz="2200" b="1" u="none" strike="noStrike" dirty="0">
+              <a:rPr lang="en-US" sz="2000" b="1" u="none" strike="noStrike" dirty="0">
                 <a:solidFill>
                   <a:srgbClr val="000000"/>
                 </a:solidFill>
@@ -8249,8 +8269,8 @@
           </a:p>
         </p:txBody>
       </p:sp>
-      <mc:AlternateContent xmlns:mc="http://schemas.openxmlformats.org/markup-compatibility/2006">
-        <mc:Choice xmlns:cx1="http://schemas.microsoft.com/office/drawing/2015/9/8/chartex" Requires="cx1">
+      <mc:AlternateContent xmlns:mc="http://schemas.openxmlformats.org/markup-compatibility/2006" xmlns:cx1="http://schemas.microsoft.com/office/drawing/2015/9/8/chartex">
+        <mc:Choice Requires="cx1">
           <p:graphicFrame>
             <p:nvGraphicFramePr>
               <p:cNvPr id="5" name="Content Placeholder 4">
@@ -8283,7 +8303,7 @@
             </a:graphic>
           </p:graphicFrame>
         </mc:Choice>
-        <mc:Fallback>
+        <mc:Fallback xmlns="">
           <p:pic>
             <p:nvPicPr>
               <p:cNvPr id="5" name="Content Placeholder 4">
@@ -8379,7 +8399,7 @@
               <a:rPr lang="en-US" b="1" dirty="0">
                 <a:effectLst/>
               </a:rPr>
-              <a:t>**Task 2: Error Troubleshooting Task**</a:t>
+              <a:t>Task 2: Error Troubleshooting Task</a:t>
             </a:r>
             <a:br>
               <a:rPr lang="en-US" b="1" dirty="0">

</xml_diff>